<commit_message>
Prob and Stats over
</commit_message>
<xml_diff>
--- a/MATHEMATICS SHORTNOTES/MATHS Revision.pptx
+++ b/MATHEMATICS SHORTNOTES/MATHS Revision.pptx
@@ -7,6 +7,9 @@
   <p:sldIdLst>
     <p:sldId id="256" r:id="rId2"/>
     <p:sldId id="257" r:id="rId3"/>
+    <p:sldId id="258" r:id="rId4"/>
+    <p:sldId id="259" r:id="rId5"/>
+    <p:sldId id="260" r:id="rId6"/>
   </p:sldIdLst>
   <p:sldSz cx="12192000" cy="6858000"/>
   <p:notesSz cx="6858000" cy="9144000"/>
@@ -262,7 +265,7 @@
           <a:p>
             <a:fld id="{EA402788-B3D0-4CAD-96CC-4B452FA47DBC}" type="datetimeFigureOut">
               <a:rPr lang="en-IN" smtClean="0"/>
-              <a:t>02-02-2023</a:t>
+              <a:t>03-02-2023</a:t>
             </a:fld>
             <a:endParaRPr lang="en-IN"/>
           </a:p>
@@ -462,7 +465,7 @@
           <a:p>
             <a:fld id="{EA402788-B3D0-4CAD-96CC-4B452FA47DBC}" type="datetimeFigureOut">
               <a:rPr lang="en-IN" smtClean="0"/>
-              <a:t>02-02-2023</a:t>
+              <a:t>03-02-2023</a:t>
             </a:fld>
             <a:endParaRPr lang="en-IN"/>
           </a:p>
@@ -672,7 +675,7 @@
           <a:p>
             <a:fld id="{EA402788-B3D0-4CAD-96CC-4B452FA47DBC}" type="datetimeFigureOut">
               <a:rPr lang="en-IN" smtClean="0"/>
-              <a:t>02-02-2023</a:t>
+              <a:t>03-02-2023</a:t>
             </a:fld>
             <a:endParaRPr lang="en-IN"/>
           </a:p>
@@ -872,7 +875,7 @@
           <a:p>
             <a:fld id="{EA402788-B3D0-4CAD-96CC-4B452FA47DBC}" type="datetimeFigureOut">
               <a:rPr lang="en-IN" smtClean="0"/>
-              <a:t>02-02-2023</a:t>
+              <a:t>03-02-2023</a:t>
             </a:fld>
             <a:endParaRPr lang="en-IN"/>
           </a:p>
@@ -1148,7 +1151,7 @@
           <a:p>
             <a:fld id="{EA402788-B3D0-4CAD-96CC-4B452FA47DBC}" type="datetimeFigureOut">
               <a:rPr lang="en-IN" smtClean="0"/>
-              <a:t>02-02-2023</a:t>
+              <a:t>03-02-2023</a:t>
             </a:fld>
             <a:endParaRPr lang="en-IN"/>
           </a:p>
@@ -1416,7 +1419,7 @@
           <a:p>
             <a:fld id="{EA402788-B3D0-4CAD-96CC-4B452FA47DBC}" type="datetimeFigureOut">
               <a:rPr lang="en-IN" smtClean="0"/>
-              <a:t>02-02-2023</a:t>
+              <a:t>03-02-2023</a:t>
             </a:fld>
             <a:endParaRPr lang="en-IN"/>
           </a:p>
@@ -1831,7 +1834,7 @@
           <a:p>
             <a:fld id="{EA402788-B3D0-4CAD-96CC-4B452FA47DBC}" type="datetimeFigureOut">
               <a:rPr lang="en-IN" smtClean="0"/>
-              <a:t>02-02-2023</a:t>
+              <a:t>03-02-2023</a:t>
             </a:fld>
             <a:endParaRPr lang="en-IN"/>
           </a:p>
@@ -1973,7 +1976,7 @@
           <a:p>
             <a:fld id="{EA402788-B3D0-4CAD-96CC-4B452FA47DBC}" type="datetimeFigureOut">
               <a:rPr lang="en-IN" smtClean="0"/>
-              <a:t>02-02-2023</a:t>
+              <a:t>03-02-2023</a:t>
             </a:fld>
             <a:endParaRPr lang="en-IN"/>
           </a:p>
@@ -2086,7 +2089,7 @@
           <a:p>
             <a:fld id="{EA402788-B3D0-4CAD-96CC-4B452FA47DBC}" type="datetimeFigureOut">
               <a:rPr lang="en-IN" smtClean="0"/>
-              <a:t>02-02-2023</a:t>
+              <a:t>03-02-2023</a:t>
             </a:fld>
             <a:endParaRPr lang="en-IN"/>
           </a:p>
@@ -2399,7 +2402,7 @@
           <a:p>
             <a:fld id="{EA402788-B3D0-4CAD-96CC-4B452FA47DBC}" type="datetimeFigureOut">
               <a:rPr lang="en-IN" smtClean="0"/>
-              <a:t>02-02-2023</a:t>
+              <a:t>03-02-2023</a:t>
             </a:fld>
             <a:endParaRPr lang="en-IN"/>
           </a:p>
@@ -2688,7 +2691,7 @@
           <a:p>
             <a:fld id="{EA402788-B3D0-4CAD-96CC-4B452FA47DBC}" type="datetimeFigureOut">
               <a:rPr lang="en-IN" smtClean="0"/>
-              <a:t>02-02-2023</a:t>
+              <a:t>03-02-2023</a:t>
             </a:fld>
             <a:endParaRPr lang="en-IN"/>
           </a:p>
@@ -2931,7 +2934,7 @@
           <a:p>
             <a:fld id="{EA402788-B3D0-4CAD-96CC-4B452FA47DBC}" type="datetimeFigureOut">
               <a:rPr lang="en-IN" smtClean="0"/>
-              <a:t>02-02-2023</a:t>
+              <a:t>03-02-2023</a:t>
             </a:fld>
             <a:endParaRPr lang="en-IN"/>
           </a:p>
@@ -6039,8 +6042,8 @@
           </a:p>
         </p:txBody>
       </p:sp>
-      <mc:AlternateContent xmlns:mc="http://schemas.openxmlformats.org/markup-compatibility/2006">
-        <mc:Choice xmlns:a14="http://schemas.microsoft.com/office/drawing/2010/main" Requires="a14">
+      <mc:AlternateContent xmlns:mc="http://schemas.openxmlformats.org/markup-compatibility/2006" xmlns:a14="http://schemas.microsoft.com/office/drawing/2010/main">
+        <mc:Choice Requires="a14">
           <p:sp>
             <p:nvSpPr>
               <p:cNvPr id="68" name="TextBox 67">
@@ -6115,7 +6118,7 @@
             </p:txBody>
           </p:sp>
         </mc:Choice>
-        <mc:Fallback>
+        <mc:Fallback xmlns="">
           <p:sp>
             <p:nvSpPr>
               <p:cNvPr id="68" name="TextBox 67">
@@ -6197,8 +6200,8 @@
           </a:p>
         </p:txBody>
       </p:sp>
-      <mc:AlternateContent xmlns:mc="http://schemas.openxmlformats.org/markup-compatibility/2006">
-        <mc:Choice xmlns:a14="http://schemas.microsoft.com/office/drawing/2010/main" Requires="a14">
+      <mc:AlternateContent xmlns:mc="http://schemas.openxmlformats.org/markup-compatibility/2006" xmlns:a14="http://schemas.microsoft.com/office/drawing/2010/main">
+        <mc:Choice Requires="a14">
           <p:sp>
             <p:nvSpPr>
               <p:cNvPr id="70" name="TextBox 69">
@@ -6267,7 +6270,7 @@
             </p:txBody>
           </p:sp>
         </mc:Choice>
-        <mc:Fallback>
+        <mc:Fallback xmlns="">
           <p:sp>
             <p:nvSpPr>
               <p:cNvPr id="70" name="TextBox 69">
@@ -6472,6 +6475,3892 @@
     <p:extLst>
       <p:ext uri="{BB962C8B-B14F-4D97-AF65-F5344CB8AC3E}">
         <p14:creationId xmlns:p14="http://schemas.microsoft.com/office/powerpoint/2010/main" val="3193372039"/>
+      </p:ext>
+    </p:extLst>
+  </p:cSld>
+  <p:clrMapOvr>
+    <a:masterClrMapping/>
+  </p:clrMapOvr>
+</p:sld>
+</file>
+
+<file path=ppt/slides/slide3.xml><?xml version="1.0" encoding="utf-8"?>
+<p:sld xmlns:a="http://schemas.openxmlformats.org/drawingml/2006/main" xmlns:r="http://schemas.openxmlformats.org/officeDocument/2006/relationships" xmlns:p="http://schemas.openxmlformats.org/presentationml/2006/main">
+  <p:cSld>
+    <p:spTree>
+      <p:nvGrpSpPr>
+        <p:cNvPr id="1" name=""/>
+        <p:cNvGrpSpPr/>
+        <p:nvPr/>
+      </p:nvGrpSpPr>
+      <p:grpSpPr>
+        <a:xfrm>
+          <a:off x="0" y="0"/>
+          <a:ext cx="0" cy="0"/>
+          <a:chOff x="0" y="0"/>
+          <a:chExt cx="0" cy="0"/>
+        </a:xfrm>
+      </p:grpSpPr>
+      <p:sp>
+        <p:nvSpPr>
+          <p:cNvPr id="12" name="Rectangle 11">
+            <a:extLst>
+              <a:ext uri="{FF2B5EF4-FFF2-40B4-BE49-F238E27FC236}">
+                <a16:creationId xmlns:a16="http://schemas.microsoft.com/office/drawing/2014/main" id="{6264A76B-FB18-4DC3-88AA-28BDE040A394}"/>
+              </a:ext>
+            </a:extLst>
+          </p:cNvPr>
+          <p:cNvSpPr/>
+          <p:nvPr/>
+        </p:nvSpPr>
+        <p:spPr>
+          <a:xfrm>
+            <a:off x="4823012" y="3505200"/>
+            <a:ext cx="1721222" cy="1550889"/>
+          </a:xfrm>
+          <a:prstGeom prst="rect">
+            <a:avLst/>
+          </a:prstGeom>
+          <a:pattFill prst="dotGrid">
+            <a:fgClr>
+              <a:schemeClr val="accent1"/>
+            </a:fgClr>
+            <a:bgClr>
+              <a:schemeClr val="bg1"/>
+            </a:bgClr>
+          </a:pattFill>
+          <a:ln>
+            <a:noFill/>
+          </a:ln>
+        </p:spPr>
+        <p:style>
+          <a:lnRef idx="2">
+            <a:schemeClr val="accent1">
+              <a:shade val="50000"/>
+            </a:schemeClr>
+          </a:lnRef>
+          <a:fillRef idx="1">
+            <a:schemeClr val="accent1"/>
+          </a:fillRef>
+          <a:effectRef idx="0">
+            <a:schemeClr val="accent1"/>
+          </a:effectRef>
+          <a:fontRef idx="minor">
+            <a:schemeClr val="lt1"/>
+          </a:fontRef>
+        </p:style>
+        <p:txBody>
+          <a:bodyPr rtlCol="0" anchor="ctr"/>
+          <a:lstStyle/>
+          <a:p>
+            <a:pPr algn="ctr"/>
+            <a:endParaRPr lang="en-IN"/>
+          </a:p>
+        </p:txBody>
+      </p:sp>
+      <p:cxnSp>
+        <p:nvCxnSpPr>
+          <p:cNvPr id="22" name="Straight Arrow Connector 21">
+            <a:extLst>
+              <a:ext uri="{FF2B5EF4-FFF2-40B4-BE49-F238E27FC236}">
+                <a16:creationId xmlns:a16="http://schemas.microsoft.com/office/drawing/2014/main" id="{DCD7D83D-561F-4C9D-91A6-56590D5820E0}"/>
+              </a:ext>
+            </a:extLst>
+          </p:cNvPr>
+          <p:cNvCxnSpPr>
+            <a:cxnSpLocks/>
+          </p:cNvCxnSpPr>
+          <p:nvPr/>
+        </p:nvCxnSpPr>
+        <p:spPr>
+          <a:xfrm flipV="1">
+            <a:off x="4099596" y="1488141"/>
+            <a:ext cx="0" cy="3621742"/>
+          </a:xfrm>
+          <a:prstGeom prst="straightConnector1">
+            <a:avLst/>
+          </a:prstGeom>
+          <a:ln w="57150">
+            <a:tailEnd type="triangle"/>
+          </a:ln>
+        </p:spPr>
+        <p:style>
+          <a:lnRef idx="1">
+            <a:schemeClr val="dk1"/>
+          </a:lnRef>
+          <a:fillRef idx="0">
+            <a:schemeClr val="dk1"/>
+          </a:fillRef>
+          <a:effectRef idx="0">
+            <a:schemeClr val="dk1"/>
+          </a:effectRef>
+          <a:fontRef idx="minor">
+            <a:schemeClr val="tx1"/>
+          </a:fontRef>
+        </p:style>
+      </p:cxnSp>
+      <p:cxnSp>
+        <p:nvCxnSpPr>
+          <p:cNvPr id="23" name="Straight Arrow Connector 22">
+            <a:extLst>
+              <a:ext uri="{FF2B5EF4-FFF2-40B4-BE49-F238E27FC236}">
+                <a16:creationId xmlns:a16="http://schemas.microsoft.com/office/drawing/2014/main" id="{811E5170-7400-4D13-9A47-E253AE5EEBD3}"/>
+              </a:ext>
+            </a:extLst>
+          </p:cNvPr>
+          <p:cNvCxnSpPr>
+            <a:cxnSpLocks/>
+          </p:cNvCxnSpPr>
+          <p:nvPr/>
+        </p:nvCxnSpPr>
+        <p:spPr>
+          <a:xfrm>
+            <a:off x="4099596" y="5082989"/>
+            <a:ext cx="3296286" cy="0"/>
+          </a:xfrm>
+          <a:prstGeom prst="straightConnector1">
+            <a:avLst/>
+          </a:prstGeom>
+          <a:ln w="57150">
+            <a:tailEnd type="triangle"/>
+          </a:ln>
+        </p:spPr>
+        <p:style>
+          <a:lnRef idx="1">
+            <a:schemeClr val="dk1"/>
+          </a:lnRef>
+          <a:fillRef idx="0">
+            <a:schemeClr val="dk1"/>
+          </a:fillRef>
+          <a:effectRef idx="0">
+            <a:schemeClr val="dk1"/>
+          </a:effectRef>
+          <a:fontRef idx="minor">
+            <a:schemeClr val="tx1"/>
+          </a:fontRef>
+        </p:style>
+      </p:cxnSp>
+      <p:cxnSp>
+        <p:nvCxnSpPr>
+          <p:cNvPr id="7" name="Straight Connector 6">
+            <a:extLst>
+              <a:ext uri="{FF2B5EF4-FFF2-40B4-BE49-F238E27FC236}">
+                <a16:creationId xmlns:a16="http://schemas.microsoft.com/office/drawing/2014/main" id="{FF0ED9CB-CAD4-42A9-A1B2-83D05DEAEBD0}"/>
+              </a:ext>
+            </a:extLst>
+          </p:cNvPr>
+          <p:cNvCxnSpPr/>
+          <p:nvPr/>
+        </p:nvCxnSpPr>
+        <p:spPr>
+          <a:xfrm>
+            <a:off x="4814047" y="3505200"/>
+            <a:ext cx="1792941" cy="0"/>
+          </a:xfrm>
+          <a:prstGeom prst="line">
+            <a:avLst/>
+          </a:prstGeom>
+          <a:ln w="38100"/>
+        </p:spPr>
+        <p:style>
+          <a:lnRef idx="1">
+            <a:schemeClr val="accent5"/>
+          </a:lnRef>
+          <a:fillRef idx="0">
+            <a:schemeClr val="accent5"/>
+          </a:fillRef>
+          <a:effectRef idx="0">
+            <a:schemeClr val="accent5"/>
+          </a:effectRef>
+          <a:fontRef idx="minor">
+            <a:schemeClr val="tx1"/>
+          </a:fontRef>
+        </p:style>
+      </p:cxnSp>
+      <p:sp>
+        <p:nvSpPr>
+          <p:cNvPr id="8" name="Oval 7">
+            <a:extLst>
+              <a:ext uri="{FF2B5EF4-FFF2-40B4-BE49-F238E27FC236}">
+                <a16:creationId xmlns:a16="http://schemas.microsoft.com/office/drawing/2014/main" id="{AC50137B-9596-4938-B0EC-6D4A95A7FE5A}"/>
+              </a:ext>
+            </a:extLst>
+          </p:cNvPr>
+          <p:cNvSpPr/>
+          <p:nvPr/>
+        </p:nvSpPr>
+        <p:spPr>
+          <a:xfrm>
+            <a:off x="4733365" y="3429000"/>
+            <a:ext cx="143434" cy="138951"/>
+          </a:xfrm>
+          <a:prstGeom prst="ellipse">
+            <a:avLst/>
+          </a:prstGeom>
+        </p:spPr>
+        <p:style>
+          <a:lnRef idx="2">
+            <a:schemeClr val="accent2">
+              <a:shade val="50000"/>
+            </a:schemeClr>
+          </a:lnRef>
+          <a:fillRef idx="1">
+            <a:schemeClr val="accent2"/>
+          </a:fillRef>
+          <a:effectRef idx="0">
+            <a:schemeClr val="accent2"/>
+          </a:effectRef>
+          <a:fontRef idx="minor">
+            <a:schemeClr val="lt1"/>
+          </a:fontRef>
+        </p:style>
+        <p:txBody>
+          <a:bodyPr rtlCol="0" anchor="ctr"/>
+          <a:lstStyle/>
+          <a:p>
+            <a:pPr algn="ctr"/>
+            <a:endParaRPr lang="en-IN"/>
+          </a:p>
+        </p:txBody>
+      </p:sp>
+      <p:sp>
+        <p:nvSpPr>
+          <p:cNvPr id="30" name="Oval 29">
+            <a:extLst>
+              <a:ext uri="{FF2B5EF4-FFF2-40B4-BE49-F238E27FC236}">
+                <a16:creationId xmlns:a16="http://schemas.microsoft.com/office/drawing/2014/main" id="{E0BA44B7-CE0C-4908-AE11-A01EBACCD0B0}"/>
+              </a:ext>
+            </a:extLst>
+          </p:cNvPr>
+          <p:cNvSpPr/>
+          <p:nvPr/>
+        </p:nvSpPr>
+        <p:spPr>
+          <a:xfrm>
+            <a:off x="6463554" y="3428999"/>
+            <a:ext cx="143434" cy="138951"/>
+          </a:xfrm>
+          <a:prstGeom prst="ellipse">
+            <a:avLst/>
+          </a:prstGeom>
+        </p:spPr>
+        <p:style>
+          <a:lnRef idx="2">
+            <a:schemeClr val="accent2">
+              <a:shade val="50000"/>
+            </a:schemeClr>
+          </a:lnRef>
+          <a:fillRef idx="1">
+            <a:schemeClr val="accent2"/>
+          </a:fillRef>
+          <a:effectRef idx="0">
+            <a:schemeClr val="accent2"/>
+          </a:effectRef>
+          <a:fontRef idx="minor">
+            <a:schemeClr val="lt1"/>
+          </a:fontRef>
+        </p:style>
+        <p:txBody>
+          <a:bodyPr rtlCol="0" anchor="ctr"/>
+          <a:lstStyle/>
+          <a:p>
+            <a:pPr algn="ctr"/>
+            <a:endParaRPr lang="en-IN"/>
+          </a:p>
+        </p:txBody>
+      </p:sp>
+      <mc:AlternateContent xmlns:mc="http://schemas.openxmlformats.org/markup-compatibility/2006">
+        <mc:Choice xmlns:a14="http://schemas.microsoft.com/office/drawing/2010/main" Requires="a14">
+          <p:sp>
+            <p:nvSpPr>
+              <p:cNvPr id="31" name="TextBox 30">
+                <a:extLst>
+                  <a:ext uri="{FF2B5EF4-FFF2-40B4-BE49-F238E27FC236}">
+                    <a16:creationId xmlns:a16="http://schemas.microsoft.com/office/drawing/2014/main" id="{2032177F-6DF4-4F27-AB29-752CA5E89F42}"/>
+                  </a:ext>
+                </a:extLst>
+              </p:cNvPr>
+              <p:cNvSpPr txBox="1"/>
+              <p:nvPr/>
+            </p:nvSpPr>
+            <p:spPr>
+              <a:xfrm>
+                <a:off x="4576481" y="2943880"/>
+                <a:ext cx="475132" cy="523220"/>
+              </a:xfrm>
+              <a:prstGeom prst="rect">
+                <a:avLst/>
+              </a:prstGeom>
+              <a:noFill/>
+            </p:spPr>
+            <p:txBody>
+              <a:bodyPr wrap="square" rtlCol="0">
+                <a:spAutoFit/>
+              </a:bodyPr>
+              <a:lstStyle/>
+              <a:p>
+                <a:pPr algn="ctr"/>
+                <a14:m>
+                  <m:oMathPara xmlns:m="http://schemas.openxmlformats.org/officeDocument/2006/math">
+                    <m:oMathParaPr>
+                      <m:jc m:val="centerGroup"/>
+                    </m:oMathParaPr>
+                    <m:oMath xmlns:m="http://schemas.openxmlformats.org/officeDocument/2006/math">
+                      <m:r>
+                        <a:rPr lang="en-IN" sz="2800" b="1" i="1" smtClean="0">
+                          <a:latin typeface="Cambria Math" panose="02040503050406030204" pitchFamily="18" charset="0"/>
+                          <a:ea typeface="Cambria Math" panose="02040503050406030204" pitchFamily="18" charset="0"/>
+                        </a:rPr>
+                        <m:t>𝜶</m:t>
+                      </m:r>
+                    </m:oMath>
+                  </m:oMathPara>
+                </a14:m>
+                <a:endParaRPr lang="en-IN" sz="2800" b="1"/>
+              </a:p>
+            </p:txBody>
+          </p:sp>
+        </mc:Choice>
+        <mc:Fallback>
+          <p:sp>
+            <p:nvSpPr>
+              <p:cNvPr id="31" name="TextBox 30">
+                <a:extLst>
+                  <a:ext uri="{FF2B5EF4-FFF2-40B4-BE49-F238E27FC236}">
+                    <a16:creationId xmlns:a16="http://schemas.microsoft.com/office/drawing/2014/main" id="{2032177F-6DF4-4F27-AB29-752CA5E89F42}"/>
+                  </a:ext>
+                </a:extLst>
+              </p:cNvPr>
+              <p:cNvSpPr txBox="1">
+                <a:spLocks noRot="1" noChangeAspect="1" noMove="1" noResize="1" noEditPoints="1" noAdjustHandles="1" noChangeArrowheads="1" noChangeShapeType="1" noTextEdit="1"/>
+              </p:cNvSpPr>
+              <p:nvPr/>
+            </p:nvSpPr>
+            <p:spPr>
+              <a:xfrm>
+                <a:off x="4576481" y="2943880"/>
+                <a:ext cx="475132" cy="523220"/>
+              </a:xfrm>
+              <a:prstGeom prst="rect">
+                <a:avLst/>
+              </a:prstGeom>
+              <a:blipFill>
+                <a:blip r:embed="rId2"/>
+                <a:stretch>
+                  <a:fillRect/>
+                </a:stretch>
+              </a:blipFill>
+            </p:spPr>
+            <p:txBody>
+              <a:bodyPr/>
+              <a:lstStyle/>
+              <a:p>
+                <a:r>
+                  <a:rPr lang="en-IN">
+                    <a:noFill/>
+                  </a:rPr>
+                  <a:t> </a:t>
+                </a:r>
+              </a:p>
+            </p:txBody>
+          </p:sp>
+        </mc:Fallback>
+      </mc:AlternateContent>
+      <mc:AlternateContent xmlns:mc="http://schemas.openxmlformats.org/markup-compatibility/2006">
+        <mc:Choice xmlns:a14="http://schemas.microsoft.com/office/drawing/2010/main" Requires="a14">
+          <p:sp>
+            <p:nvSpPr>
+              <p:cNvPr id="32" name="TextBox 31">
+                <a:extLst>
+                  <a:ext uri="{FF2B5EF4-FFF2-40B4-BE49-F238E27FC236}">
+                    <a16:creationId xmlns:a16="http://schemas.microsoft.com/office/drawing/2014/main" id="{005F68F1-7D0B-48A3-88D8-6A36784F5CF7}"/>
+                  </a:ext>
+                </a:extLst>
+              </p:cNvPr>
+              <p:cNvSpPr txBox="1"/>
+              <p:nvPr/>
+            </p:nvSpPr>
+            <p:spPr>
+              <a:xfrm>
+                <a:off x="6369422" y="2919230"/>
+                <a:ext cx="475132" cy="523220"/>
+              </a:xfrm>
+              <a:prstGeom prst="rect">
+                <a:avLst/>
+              </a:prstGeom>
+              <a:noFill/>
+            </p:spPr>
+            <p:txBody>
+              <a:bodyPr wrap="square" rtlCol="0">
+                <a:spAutoFit/>
+              </a:bodyPr>
+              <a:lstStyle/>
+              <a:p>
+                <a:pPr algn="ctr"/>
+                <a14:m>
+                  <m:oMathPara xmlns:m="http://schemas.openxmlformats.org/officeDocument/2006/math">
+                    <m:oMathParaPr>
+                      <m:jc m:val="centerGroup"/>
+                    </m:oMathParaPr>
+                    <m:oMath xmlns:m="http://schemas.openxmlformats.org/officeDocument/2006/math">
+                      <m:r>
+                        <a:rPr lang="en-IN" sz="2800" b="1" i="1" smtClean="0">
+                          <a:latin typeface="Cambria Math" panose="02040503050406030204" pitchFamily="18" charset="0"/>
+                          <a:ea typeface="Cambria Math" panose="02040503050406030204" pitchFamily="18" charset="0"/>
+                        </a:rPr>
+                        <m:t>𝜷</m:t>
+                      </m:r>
+                    </m:oMath>
+                  </m:oMathPara>
+                </a14:m>
+                <a:endParaRPr lang="en-IN" sz="2800" b="1"/>
+              </a:p>
+            </p:txBody>
+          </p:sp>
+        </mc:Choice>
+        <mc:Fallback>
+          <p:sp>
+            <p:nvSpPr>
+              <p:cNvPr id="32" name="TextBox 31">
+                <a:extLst>
+                  <a:ext uri="{FF2B5EF4-FFF2-40B4-BE49-F238E27FC236}">
+                    <a16:creationId xmlns:a16="http://schemas.microsoft.com/office/drawing/2014/main" id="{005F68F1-7D0B-48A3-88D8-6A36784F5CF7}"/>
+                  </a:ext>
+                </a:extLst>
+              </p:cNvPr>
+              <p:cNvSpPr txBox="1">
+                <a:spLocks noRot="1" noChangeAspect="1" noMove="1" noResize="1" noEditPoints="1" noAdjustHandles="1" noChangeArrowheads="1" noChangeShapeType="1" noTextEdit="1"/>
+              </p:cNvSpPr>
+              <p:nvPr/>
+            </p:nvSpPr>
+            <p:spPr>
+              <a:xfrm>
+                <a:off x="6369422" y="2919230"/>
+                <a:ext cx="475132" cy="523220"/>
+              </a:xfrm>
+              <a:prstGeom prst="rect">
+                <a:avLst/>
+              </a:prstGeom>
+              <a:blipFill>
+                <a:blip r:embed="rId3"/>
+                <a:stretch>
+                  <a:fillRect/>
+                </a:stretch>
+              </a:blipFill>
+            </p:spPr>
+            <p:txBody>
+              <a:bodyPr/>
+              <a:lstStyle/>
+              <a:p>
+                <a:r>
+                  <a:rPr lang="en-IN">
+                    <a:noFill/>
+                  </a:rPr>
+                  <a:t> </a:t>
+                </a:r>
+              </a:p>
+            </p:txBody>
+          </p:sp>
+        </mc:Fallback>
+      </mc:AlternateContent>
+      <mc:AlternateContent xmlns:mc="http://schemas.openxmlformats.org/markup-compatibility/2006">
+        <mc:Choice xmlns:a14="http://schemas.microsoft.com/office/drawing/2010/main" Requires="a14">
+          <p:sp>
+            <p:nvSpPr>
+              <p:cNvPr id="34" name="TextBox 33">
+                <a:extLst>
+                  <a:ext uri="{FF2B5EF4-FFF2-40B4-BE49-F238E27FC236}">
+                    <a16:creationId xmlns:a16="http://schemas.microsoft.com/office/drawing/2014/main" id="{15A37F3F-27BE-4BE2-9297-B0C480FBC917}"/>
+                  </a:ext>
+                </a:extLst>
+              </p:cNvPr>
+              <p:cNvSpPr txBox="1"/>
+              <p:nvPr/>
+            </p:nvSpPr>
+            <p:spPr>
+              <a:xfrm>
+                <a:off x="3951677" y="964921"/>
+                <a:ext cx="475132" cy="523220"/>
+              </a:xfrm>
+              <a:prstGeom prst="rect">
+                <a:avLst/>
+              </a:prstGeom>
+              <a:noFill/>
+            </p:spPr>
+            <p:txBody>
+              <a:bodyPr wrap="square" rtlCol="0">
+                <a:spAutoFit/>
+              </a:bodyPr>
+              <a:lstStyle/>
+              <a:p>
+                <a:pPr algn="ctr"/>
+                <a14:m>
+                  <m:oMathPara xmlns:m="http://schemas.openxmlformats.org/officeDocument/2006/math">
+                    <m:oMathParaPr>
+                      <m:jc m:val="centerGroup"/>
+                    </m:oMathParaPr>
+                    <m:oMath xmlns:m="http://schemas.openxmlformats.org/officeDocument/2006/math">
+                      <m:r>
+                        <a:rPr lang="en-US" sz="2800" b="1" i="1" smtClean="0">
+                          <a:latin typeface="Cambria Math" panose="02040503050406030204" pitchFamily="18" charset="0"/>
+                        </a:rPr>
+                        <m:t>𝒇</m:t>
+                      </m:r>
+                      <m:d>
+                        <m:dPr>
+                          <m:ctrlPr>
+                            <a:rPr lang="en-US" sz="2800" b="1" i="1" smtClean="0">
+                              <a:latin typeface="Cambria Math" panose="02040503050406030204" pitchFamily="18" charset="0"/>
+                            </a:rPr>
+                          </m:ctrlPr>
+                        </m:dPr>
+                        <m:e>
+                          <m:r>
+                            <a:rPr lang="en-US" sz="2800" b="1" i="1" smtClean="0">
+                              <a:latin typeface="Cambria Math" panose="02040503050406030204" pitchFamily="18" charset="0"/>
+                            </a:rPr>
+                            <m:t>𝒙</m:t>
+                          </m:r>
+                        </m:e>
+                      </m:d>
+                    </m:oMath>
+                  </m:oMathPara>
+                </a14:m>
+                <a:endParaRPr lang="en-IN" sz="2800" b="1"/>
+              </a:p>
+            </p:txBody>
+          </p:sp>
+        </mc:Choice>
+        <mc:Fallback>
+          <p:sp>
+            <p:nvSpPr>
+              <p:cNvPr id="34" name="TextBox 33">
+                <a:extLst>
+                  <a:ext uri="{FF2B5EF4-FFF2-40B4-BE49-F238E27FC236}">
+                    <a16:creationId xmlns:a16="http://schemas.microsoft.com/office/drawing/2014/main" id="{15A37F3F-27BE-4BE2-9297-B0C480FBC917}"/>
+                  </a:ext>
+                </a:extLst>
+              </p:cNvPr>
+              <p:cNvSpPr txBox="1">
+                <a:spLocks noRot="1" noChangeAspect="1" noMove="1" noResize="1" noEditPoints="1" noAdjustHandles="1" noChangeArrowheads="1" noChangeShapeType="1" noTextEdit="1"/>
+              </p:cNvSpPr>
+              <p:nvPr/>
+            </p:nvSpPr>
+            <p:spPr>
+              <a:xfrm>
+                <a:off x="3951677" y="964921"/>
+                <a:ext cx="475132" cy="523220"/>
+              </a:xfrm>
+              <a:prstGeom prst="rect">
+                <a:avLst/>
+              </a:prstGeom>
+              <a:blipFill>
+                <a:blip r:embed="rId4"/>
+                <a:stretch>
+                  <a:fillRect l="-33333" r="-8974"/>
+                </a:stretch>
+              </a:blipFill>
+            </p:spPr>
+            <p:txBody>
+              <a:bodyPr/>
+              <a:lstStyle/>
+              <a:p>
+                <a:r>
+                  <a:rPr lang="en-IN">
+                    <a:noFill/>
+                  </a:rPr>
+                  <a:t> </a:t>
+                </a:r>
+              </a:p>
+            </p:txBody>
+          </p:sp>
+        </mc:Fallback>
+      </mc:AlternateContent>
+      <mc:AlternateContent xmlns:mc="http://schemas.openxmlformats.org/markup-compatibility/2006">
+        <mc:Choice xmlns:a14="http://schemas.microsoft.com/office/drawing/2010/main" Requires="a14">
+          <p:sp>
+            <p:nvSpPr>
+              <p:cNvPr id="35" name="TextBox 34">
+                <a:extLst>
+                  <a:ext uri="{FF2B5EF4-FFF2-40B4-BE49-F238E27FC236}">
+                    <a16:creationId xmlns:a16="http://schemas.microsoft.com/office/drawing/2014/main" id="{557C53B4-12E8-477C-B316-582800115793}"/>
+                  </a:ext>
+                </a:extLst>
+              </p:cNvPr>
+              <p:cNvSpPr txBox="1"/>
+              <p:nvPr/>
+            </p:nvSpPr>
+            <p:spPr>
+              <a:xfrm>
+                <a:off x="7437979" y="4794479"/>
+                <a:ext cx="475132" cy="523220"/>
+              </a:xfrm>
+              <a:prstGeom prst="rect">
+                <a:avLst/>
+              </a:prstGeom>
+              <a:noFill/>
+            </p:spPr>
+            <p:txBody>
+              <a:bodyPr wrap="square" rtlCol="0">
+                <a:spAutoFit/>
+              </a:bodyPr>
+              <a:lstStyle/>
+              <a:p>
+                <a:pPr algn="ctr"/>
+                <a14:m>
+                  <m:oMathPara xmlns:m="http://schemas.openxmlformats.org/officeDocument/2006/math">
+                    <m:oMathParaPr>
+                      <m:jc m:val="centerGroup"/>
+                    </m:oMathParaPr>
+                    <m:oMath xmlns:m="http://schemas.openxmlformats.org/officeDocument/2006/math">
+                      <m:r>
+                        <a:rPr lang="en-US" sz="2800" b="1" i="1" smtClean="0">
+                          <a:latin typeface="Cambria Math" panose="02040503050406030204" pitchFamily="18" charset="0"/>
+                        </a:rPr>
+                        <m:t>𝒂</m:t>
+                      </m:r>
+                    </m:oMath>
+                  </m:oMathPara>
+                </a14:m>
+                <a:endParaRPr lang="en-IN" sz="2800" b="1"/>
+              </a:p>
+            </p:txBody>
+          </p:sp>
+        </mc:Choice>
+        <mc:Fallback>
+          <p:sp>
+            <p:nvSpPr>
+              <p:cNvPr id="35" name="TextBox 34">
+                <a:extLst>
+                  <a:ext uri="{FF2B5EF4-FFF2-40B4-BE49-F238E27FC236}">
+                    <a16:creationId xmlns:a16="http://schemas.microsoft.com/office/drawing/2014/main" id="{557C53B4-12E8-477C-B316-582800115793}"/>
+                  </a:ext>
+                </a:extLst>
+              </p:cNvPr>
+              <p:cNvSpPr txBox="1">
+                <a:spLocks noRot="1" noChangeAspect="1" noMove="1" noResize="1" noEditPoints="1" noAdjustHandles="1" noChangeArrowheads="1" noChangeShapeType="1" noTextEdit="1"/>
+              </p:cNvSpPr>
+              <p:nvPr/>
+            </p:nvSpPr>
+            <p:spPr>
+              <a:xfrm>
+                <a:off x="7437979" y="4794479"/>
+                <a:ext cx="475132" cy="523220"/>
+              </a:xfrm>
+              <a:prstGeom prst="rect">
+                <a:avLst/>
+              </a:prstGeom>
+              <a:blipFill>
+                <a:blip r:embed="rId5"/>
+                <a:stretch>
+                  <a:fillRect/>
+                </a:stretch>
+              </a:blipFill>
+            </p:spPr>
+            <p:txBody>
+              <a:bodyPr/>
+              <a:lstStyle/>
+              <a:p>
+                <a:r>
+                  <a:rPr lang="en-IN">
+                    <a:noFill/>
+                  </a:rPr>
+                  <a:t> </a:t>
+                </a:r>
+              </a:p>
+            </p:txBody>
+          </p:sp>
+        </mc:Fallback>
+      </mc:AlternateContent>
+    </p:spTree>
+    <p:extLst>
+      <p:ext uri="{BB962C8B-B14F-4D97-AF65-F5344CB8AC3E}">
+        <p14:creationId xmlns:p14="http://schemas.microsoft.com/office/powerpoint/2010/main" val="3331022154"/>
+      </p:ext>
+    </p:extLst>
+  </p:cSld>
+  <p:clrMapOvr>
+    <a:masterClrMapping/>
+  </p:clrMapOvr>
+</p:sld>
+</file>
+
+<file path=ppt/slides/slide4.xml><?xml version="1.0" encoding="utf-8"?>
+<p:sld xmlns:a="http://schemas.openxmlformats.org/drawingml/2006/main" xmlns:r="http://schemas.openxmlformats.org/officeDocument/2006/relationships" xmlns:p="http://schemas.openxmlformats.org/presentationml/2006/main">
+  <p:cSld>
+    <p:spTree>
+      <p:nvGrpSpPr>
+        <p:cNvPr id="1" name=""/>
+        <p:cNvGrpSpPr/>
+        <p:nvPr/>
+      </p:nvGrpSpPr>
+      <p:grpSpPr>
+        <a:xfrm>
+          <a:off x="0" y="0"/>
+          <a:ext cx="0" cy="0"/>
+          <a:chOff x="0" y="0"/>
+          <a:chExt cx="0" cy="0"/>
+        </a:xfrm>
+      </p:grpSpPr>
+      <p:cxnSp>
+        <p:nvCxnSpPr>
+          <p:cNvPr id="22" name="Straight Arrow Connector 21">
+            <a:extLst>
+              <a:ext uri="{FF2B5EF4-FFF2-40B4-BE49-F238E27FC236}">
+                <a16:creationId xmlns:a16="http://schemas.microsoft.com/office/drawing/2014/main" id="{DCD7D83D-561F-4C9D-91A6-56590D5820E0}"/>
+              </a:ext>
+            </a:extLst>
+          </p:cNvPr>
+          <p:cNvCxnSpPr>
+            <a:cxnSpLocks/>
+          </p:cNvCxnSpPr>
+          <p:nvPr/>
+        </p:nvCxnSpPr>
+        <p:spPr>
+          <a:xfrm flipV="1">
+            <a:off x="5847714" y="1618129"/>
+            <a:ext cx="0" cy="3621742"/>
+          </a:xfrm>
+          <a:prstGeom prst="straightConnector1">
+            <a:avLst/>
+          </a:prstGeom>
+          <a:ln w="57150">
+            <a:tailEnd type="triangle"/>
+          </a:ln>
+        </p:spPr>
+        <p:style>
+          <a:lnRef idx="1">
+            <a:schemeClr val="dk1"/>
+          </a:lnRef>
+          <a:fillRef idx="0">
+            <a:schemeClr val="dk1"/>
+          </a:fillRef>
+          <a:effectRef idx="0">
+            <a:schemeClr val="dk1"/>
+          </a:effectRef>
+          <a:fontRef idx="minor">
+            <a:schemeClr val="tx1"/>
+          </a:fontRef>
+        </p:style>
+      </p:cxnSp>
+      <mc:AlternateContent xmlns:mc="http://schemas.openxmlformats.org/markup-compatibility/2006">
+        <mc:Choice xmlns:a14="http://schemas.microsoft.com/office/drawing/2010/main" Requires="a14">
+          <p:sp>
+            <p:nvSpPr>
+              <p:cNvPr id="34" name="TextBox 33">
+                <a:extLst>
+                  <a:ext uri="{FF2B5EF4-FFF2-40B4-BE49-F238E27FC236}">
+                    <a16:creationId xmlns:a16="http://schemas.microsoft.com/office/drawing/2014/main" id="{15A37F3F-27BE-4BE2-9297-B0C480FBC917}"/>
+                  </a:ext>
+                </a:extLst>
+              </p:cNvPr>
+              <p:cNvSpPr txBox="1"/>
+              <p:nvPr/>
+            </p:nvSpPr>
+            <p:spPr>
+              <a:xfrm>
+                <a:off x="5699795" y="1094909"/>
+                <a:ext cx="475132" cy="523220"/>
+              </a:xfrm>
+              <a:prstGeom prst="rect">
+                <a:avLst/>
+              </a:prstGeom>
+              <a:noFill/>
+            </p:spPr>
+            <p:txBody>
+              <a:bodyPr wrap="square" rtlCol="0">
+                <a:spAutoFit/>
+              </a:bodyPr>
+              <a:lstStyle/>
+              <a:p>
+                <a:pPr algn="ctr"/>
+                <a14:m>
+                  <m:oMathPara xmlns:m="http://schemas.openxmlformats.org/officeDocument/2006/math">
+                    <m:oMathParaPr>
+                      <m:jc m:val="centerGroup"/>
+                    </m:oMathParaPr>
+                    <m:oMath xmlns:m="http://schemas.openxmlformats.org/officeDocument/2006/math">
+                      <m:r>
+                        <a:rPr lang="en-US" sz="2800" b="1" i="1" smtClean="0">
+                          <a:latin typeface="Cambria Math" panose="02040503050406030204" pitchFamily="18" charset="0"/>
+                        </a:rPr>
+                        <m:t>𝒇</m:t>
+                      </m:r>
+                      <m:d>
+                        <m:dPr>
+                          <m:ctrlPr>
+                            <a:rPr lang="en-US" sz="2800" b="1" i="1" smtClean="0">
+                              <a:latin typeface="Cambria Math" panose="02040503050406030204" pitchFamily="18" charset="0"/>
+                            </a:rPr>
+                          </m:ctrlPr>
+                        </m:dPr>
+                        <m:e>
+                          <m:r>
+                            <a:rPr lang="en-US" sz="2800" b="1" i="1" smtClean="0">
+                              <a:latin typeface="Cambria Math" panose="02040503050406030204" pitchFamily="18" charset="0"/>
+                            </a:rPr>
+                            <m:t>𝒙</m:t>
+                          </m:r>
+                        </m:e>
+                      </m:d>
+                    </m:oMath>
+                  </m:oMathPara>
+                </a14:m>
+                <a:endParaRPr lang="en-IN" sz="2800" b="1"/>
+              </a:p>
+            </p:txBody>
+          </p:sp>
+        </mc:Choice>
+        <mc:Fallback>
+          <p:sp>
+            <p:nvSpPr>
+              <p:cNvPr id="34" name="TextBox 33">
+                <a:extLst>
+                  <a:ext uri="{FF2B5EF4-FFF2-40B4-BE49-F238E27FC236}">
+                    <a16:creationId xmlns:a16="http://schemas.microsoft.com/office/drawing/2014/main" id="{15A37F3F-27BE-4BE2-9297-B0C480FBC917}"/>
+                  </a:ext>
+                </a:extLst>
+              </p:cNvPr>
+              <p:cNvSpPr txBox="1">
+                <a:spLocks noRot="1" noChangeAspect="1" noMove="1" noResize="1" noEditPoints="1" noAdjustHandles="1" noChangeArrowheads="1" noChangeShapeType="1" noTextEdit="1"/>
+              </p:cNvSpPr>
+              <p:nvPr/>
+            </p:nvSpPr>
+            <p:spPr>
+              <a:xfrm>
+                <a:off x="5699795" y="1094909"/>
+                <a:ext cx="475132" cy="523220"/>
+              </a:xfrm>
+              <a:prstGeom prst="rect">
+                <a:avLst/>
+              </a:prstGeom>
+              <a:blipFill>
+                <a:blip r:embed="rId2"/>
+                <a:stretch>
+                  <a:fillRect l="-33333" r="-7692"/>
+                </a:stretch>
+              </a:blipFill>
+            </p:spPr>
+            <p:txBody>
+              <a:bodyPr/>
+              <a:lstStyle/>
+              <a:p>
+                <a:r>
+                  <a:rPr lang="en-IN">
+                    <a:noFill/>
+                  </a:rPr>
+                  <a:t> </a:t>
+                </a:r>
+              </a:p>
+            </p:txBody>
+          </p:sp>
+        </mc:Fallback>
+      </mc:AlternateContent>
+      <p:cxnSp>
+        <p:nvCxnSpPr>
+          <p:cNvPr id="3" name="Straight Arrow Connector 2">
+            <a:extLst>
+              <a:ext uri="{FF2B5EF4-FFF2-40B4-BE49-F238E27FC236}">
+                <a16:creationId xmlns:a16="http://schemas.microsoft.com/office/drawing/2014/main" id="{F4215EF3-0F05-4328-9F56-B904E0B852F6}"/>
+              </a:ext>
+            </a:extLst>
+          </p:cNvPr>
+          <p:cNvCxnSpPr>
+            <a:cxnSpLocks/>
+          </p:cNvCxnSpPr>
+          <p:nvPr/>
+        </p:nvCxnSpPr>
+        <p:spPr>
+          <a:xfrm>
+            <a:off x="717176" y="5239871"/>
+            <a:ext cx="10470777" cy="0"/>
+          </a:xfrm>
+          <a:prstGeom prst="straightConnector1">
+            <a:avLst/>
+          </a:prstGeom>
+          <a:ln w="57150">
+            <a:headEnd type="triangle"/>
+            <a:tailEnd type="triangle"/>
+          </a:ln>
+        </p:spPr>
+        <p:style>
+          <a:lnRef idx="1">
+            <a:schemeClr val="dk1"/>
+          </a:lnRef>
+          <a:fillRef idx="0">
+            <a:schemeClr val="dk1"/>
+          </a:fillRef>
+          <a:effectRef idx="0">
+            <a:schemeClr val="dk1"/>
+          </a:effectRef>
+          <a:fontRef idx="minor">
+            <a:schemeClr val="tx1"/>
+          </a:fontRef>
+        </p:style>
+      </p:cxnSp>
+      <mc:AlternateContent xmlns:mc="http://schemas.openxmlformats.org/markup-compatibility/2006">
+        <mc:Choice xmlns:a14="http://schemas.microsoft.com/office/drawing/2010/main" Requires="a14">
+          <p:sp>
+            <p:nvSpPr>
+              <p:cNvPr id="14" name="TextBox 13">
+                <a:extLst>
+                  <a:ext uri="{FF2B5EF4-FFF2-40B4-BE49-F238E27FC236}">
+                    <a16:creationId xmlns:a16="http://schemas.microsoft.com/office/drawing/2014/main" id="{0F1EE266-E032-43B9-8C05-A8547CB5DBCB}"/>
+                  </a:ext>
+                </a:extLst>
+              </p:cNvPr>
+              <p:cNvSpPr txBox="1"/>
+              <p:nvPr/>
+            </p:nvSpPr>
+            <p:spPr>
+              <a:xfrm>
+                <a:off x="11113993" y="4978261"/>
+                <a:ext cx="475132" cy="523220"/>
+              </a:xfrm>
+              <a:prstGeom prst="rect">
+                <a:avLst/>
+              </a:prstGeom>
+              <a:noFill/>
+            </p:spPr>
+            <p:txBody>
+              <a:bodyPr wrap="square" rtlCol="0">
+                <a:spAutoFit/>
+              </a:bodyPr>
+              <a:lstStyle/>
+              <a:p>
+                <a:pPr algn="ctr"/>
+                <a14:m>
+                  <m:oMathPara xmlns:m="http://schemas.openxmlformats.org/officeDocument/2006/math">
+                    <m:oMathParaPr>
+                      <m:jc m:val="centerGroup"/>
+                    </m:oMathParaPr>
+                    <m:oMath xmlns:m="http://schemas.openxmlformats.org/officeDocument/2006/math">
+                      <m:r>
+                        <a:rPr lang="en-US" sz="2800" b="1" i="1" smtClean="0">
+                          <a:latin typeface="Cambria Math" panose="02040503050406030204" pitchFamily="18" charset="0"/>
+                        </a:rPr>
+                        <m:t>𝑿</m:t>
+                      </m:r>
+                    </m:oMath>
+                  </m:oMathPara>
+                </a14:m>
+                <a:endParaRPr lang="en-IN" sz="2800" b="1"/>
+              </a:p>
+            </p:txBody>
+          </p:sp>
+        </mc:Choice>
+        <mc:Fallback>
+          <p:sp>
+            <p:nvSpPr>
+              <p:cNvPr id="14" name="TextBox 13">
+                <a:extLst>
+                  <a:ext uri="{FF2B5EF4-FFF2-40B4-BE49-F238E27FC236}">
+                    <a16:creationId xmlns:a16="http://schemas.microsoft.com/office/drawing/2014/main" id="{0F1EE266-E032-43B9-8C05-A8547CB5DBCB}"/>
+                  </a:ext>
+                </a:extLst>
+              </p:cNvPr>
+              <p:cNvSpPr txBox="1">
+                <a:spLocks noRot="1" noChangeAspect="1" noMove="1" noResize="1" noEditPoints="1" noAdjustHandles="1" noChangeArrowheads="1" noChangeShapeType="1" noTextEdit="1"/>
+              </p:cNvSpPr>
+              <p:nvPr/>
+            </p:nvSpPr>
+            <p:spPr>
+              <a:xfrm>
+                <a:off x="11113993" y="4978261"/>
+                <a:ext cx="475132" cy="523220"/>
+              </a:xfrm>
+              <a:prstGeom prst="rect">
+                <a:avLst/>
+              </a:prstGeom>
+              <a:blipFill>
+                <a:blip r:embed="rId3"/>
+                <a:stretch>
+                  <a:fillRect/>
+                </a:stretch>
+              </a:blipFill>
+            </p:spPr>
+            <p:txBody>
+              <a:bodyPr/>
+              <a:lstStyle/>
+              <a:p>
+                <a:r>
+                  <a:rPr lang="en-IN">
+                    <a:noFill/>
+                  </a:rPr>
+                  <a:t> </a:t>
+                </a:r>
+              </a:p>
+            </p:txBody>
+          </p:sp>
+        </mc:Fallback>
+      </mc:AlternateContent>
+      <p:sp>
+        <p:nvSpPr>
+          <p:cNvPr id="4" name="Freeform: Shape 3">
+            <a:extLst>
+              <a:ext uri="{FF2B5EF4-FFF2-40B4-BE49-F238E27FC236}">
+                <a16:creationId xmlns:a16="http://schemas.microsoft.com/office/drawing/2014/main" id="{599858E6-3D11-47C2-9ED3-B4F249DF0086}"/>
+              </a:ext>
+            </a:extLst>
+          </p:cNvPr>
+          <p:cNvSpPr/>
+          <p:nvPr/>
+        </p:nvSpPr>
+        <p:spPr>
+          <a:xfrm>
+            <a:off x="1192307" y="2878386"/>
+            <a:ext cx="4652681" cy="2124436"/>
+          </a:xfrm>
+          <a:custGeom>
+            <a:avLst/>
+            <a:gdLst>
+              <a:gd name="connsiteX0" fmla="*/ 0 w 3684494"/>
+              <a:gd name="connsiteY0" fmla="*/ 2105990 h 2124436"/>
+              <a:gd name="connsiteX1" fmla="*/ 555812 w 3684494"/>
+              <a:gd name="connsiteY1" fmla="*/ 2114955 h 2124436"/>
+              <a:gd name="connsiteX2" fmla="*/ 1004047 w 3684494"/>
+              <a:gd name="connsiteY2" fmla="*/ 1989449 h 2124436"/>
+              <a:gd name="connsiteX3" fmla="*/ 1506070 w 3684494"/>
+              <a:gd name="connsiteY3" fmla="*/ 1568108 h 2124436"/>
+              <a:gd name="connsiteX4" fmla="*/ 2268070 w 3684494"/>
+              <a:gd name="connsiteY4" fmla="*/ 815073 h 2124436"/>
+              <a:gd name="connsiteX5" fmla="*/ 2877670 w 3684494"/>
+              <a:gd name="connsiteY5" fmla="*/ 348908 h 2124436"/>
+              <a:gd name="connsiteX6" fmla="*/ 3397623 w 3684494"/>
+              <a:gd name="connsiteY6" fmla="*/ 44108 h 2124436"/>
+              <a:gd name="connsiteX7" fmla="*/ 3684494 w 3684494"/>
+              <a:gd name="connsiteY7" fmla="*/ 8249 h 2124436"/>
+            </a:gdLst>
+            <a:ahLst/>
+            <a:cxnLst>
+              <a:cxn ang="0">
+                <a:pos x="connsiteX0" y="connsiteY0"/>
+              </a:cxn>
+              <a:cxn ang="0">
+                <a:pos x="connsiteX1" y="connsiteY1"/>
+              </a:cxn>
+              <a:cxn ang="0">
+                <a:pos x="connsiteX2" y="connsiteY2"/>
+              </a:cxn>
+              <a:cxn ang="0">
+                <a:pos x="connsiteX3" y="connsiteY3"/>
+              </a:cxn>
+              <a:cxn ang="0">
+                <a:pos x="connsiteX4" y="connsiteY4"/>
+              </a:cxn>
+              <a:cxn ang="0">
+                <a:pos x="connsiteX5" y="connsiteY5"/>
+              </a:cxn>
+              <a:cxn ang="0">
+                <a:pos x="connsiteX6" y="connsiteY6"/>
+              </a:cxn>
+              <a:cxn ang="0">
+                <a:pos x="connsiteX7" y="connsiteY7"/>
+              </a:cxn>
+            </a:cxnLst>
+            <a:rect l="l" t="t" r="r" b="b"/>
+            <a:pathLst>
+              <a:path w="3684494" h="2124436">
+                <a:moveTo>
+                  <a:pt x="0" y="2105990"/>
+                </a:moveTo>
+                <a:cubicBezTo>
+                  <a:pt x="194235" y="2120184"/>
+                  <a:pt x="388471" y="2134378"/>
+                  <a:pt x="555812" y="2114955"/>
+                </a:cubicBezTo>
+                <a:cubicBezTo>
+                  <a:pt x="723153" y="2095532"/>
+                  <a:pt x="845671" y="2080590"/>
+                  <a:pt x="1004047" y="1989449"/>
+                </a:cubicBezTo>
+                <a:cubicBezTo>
+                  <a:pt x="1162423" y="1898308"/>
+                  <a:pt x="1295400" y="1763837"/>
+                  <a:pt x="1506070" y="1568108"/>
+                </a:cubicBezTo>
+                <a:cubicBezTo>
+                  <a:pt x="1716740" y="1372379"/>
+                  <a:pt x="2039470" y="1018273"/>
+                  <a:pt x="2268070" y="815073"/>
+                </a:cubicBezTo>
+                <a:cubicBezTo>
+                  <a:pt x="2496670" y="611873"/>
+                  <a:pt x="2689411" y="477402"/>
+                  <a:pt x="2877670" y="348908"/>
+                </a:cubicBezTo>
+                <a:cubicBezTo>
+                  <a:pt x="3065929" y="220414"/>
+                  <a:pt x="3263152" y="100884"/>
+                  <a:pt x="3397623" y="44108"/>
+                </a:cubicBezTo>
+                <a:cubicBezTo>
+                  <a:pt x="3532094" y="-12668"/>
+                  <a:pt x="3608294" y="-2210"/>
+                  <a:pt x="3684494" y="8249"/>
+                </a:cubicBezTo>
+              </a:path>
+            </a:pathLst>
+          </a:custGeom>
+          <a:noFill/>
+        </p:spPr>
+        <p:style>
+          <a:lnRef idx="2">
+            <a:schemeClr val="accent1">
+              <a:shade val="50000"/>
+            </a:schemeClr>
+          </a:lnRef>
+          <a:fillRef idx="1">
+            <a:schemeClr val="accent1"/>
+          </a:fillRef>
+          <a:effectRef idx="0">
+            <a:schemeClr val="accent1"/>
+          </a:effectRef>
+          <a:fontRef idx="minor">
+            <a:schemeClr val="lt1"/>
+          </a:fontRef>
+        </p:style>
+        <p:txBody>
+          <a:bodyPr rtlCol="0" anchor="ctr"/>
+          <a:lstStyle/>
+          <a:p>
+            <a:pPr algn="ctr"/>
+            <a:endParaRPr lang="en-IN"/>
+          </a:p>
+        </p:txBody>
+      </p:sp>
+      <p:sp>
+        <p:nvSpPr>
+          <p:cNvPr id="16" name="Freeform: Shape 15">
+            <a:extLst>
+              <a:ext uri="{FF2B5EF4-FFF2-40B4-BE49-F238E27FC236}">
+                <a16:creationId xmlns:a16="http://schemas.microsoft.com/office/drawing/2014/main" id="{70EE53E0-845C-4ABE-868F-DF659B0BDEA5}"/>
+              </a:ext>
+            </a:extLst>
+          </p:cNvPr>
+          <p:cNvSpPr/>
+          <p:nvPr/>
+        </p:nvSpPr>
+        <p:spPr>
+          <a:xfrm flipH="1">
+            <a:off x="5844987" y="2878386"/>
+            <a:ext cx="4903693" cy="2124436"/>
+          </a:xfrm>
+          <a:custGeom>
+            <a:avLst/>
+            <a:gdLst>
+              <a:gd name="connsiteX0" fmla="*/ 0 w 3684494"/>
+              <a:gd name="connsiteY0" fmla="*/ 2105990 h 2124436"/>
+              <a:gd name="connsiteX1" fmla="*/ 555812 w 3684494"/>
+              <a:gd name="connsiteY1" fmla="*/ 2114955 h 2124436"/>
+              <a:gd name="connsiteX2" fmla="*/ 1004047 w 3684494"/>
+              <a:gd name="connsiteY2" fmla="*/ 1989449 h 2124436"/>
+              <a:gd name="connsiteX3" fmla="*/ 1506070 w 3684494"/>
+              <a:gd name="connsiteY3" fmla="*/ 1568108 h 2124436"/>
+              <a:gd name="connsiteX4" fmla="*/ 2268070 w 3684494"/>
+              <a:gd name="connsiteY4" fmla="*/ 815073 h 2124436"/>
+              <a:gd name="connsiteX5" fmla="*/ 2877670 w 3684494"/>
+              <a:gd name="connsiteY5" fmla="*/ 348908 h 2124436"/>
+              <a:gd name="connsiteX6" fmla="*/ 3397623 w 3684494"/>
+              <a:gd name="connsiteY6" fmla="*/ 44108 h 2124436"/>
+              <a:gd name="connsiteX7" fmla="*/ 3684494 w 3684494"/>
+              <a:gd name="connsiteY7" fmla="*/ 8249 h 2124436"/>
+            </a:gdLst>
+            <a:ahLst/>
+            <a:cxnLst>
+              <a:cxn ang="0">
+                <a:pos x="connsiteX0" y="connsiteY0"/>
+              </a:cxn>
+              <a:cxn ang="0">
+                <a:pos x="connsiteX1" y="connsiteY1"/>
+              </a:cxn>
+              <a:cxn ang="0">
+                <a:pos x="connsiteX2" y="connsiteY2"/>
+              </a:cxn>
+              <a:cxn ang="0">
+                <a:pos x="connsiteX3" y="connsiteY3"/>
+              </a:cxn>
+              <a:cxn ang="0">
+                <a:pos x="connsiteX4" y="connsiteY4"/>
+              </a:cxn>
+              <a:cxn ang="0">
+                <a:pos x="connsiteX5" y="connsiteY5"/>
+              </a:cxn>
+              <a:cxn ang="0">
+                <a:pos x="connsiteX6" y="connsiteY6"/>
+              </a:cxn>
+              <a:cxn ang="0">
+                <a:pos x="connsiteX7" y="connsiteY7"/>
+              </a:cxn>
+            </a:cxnLst>
+            <a:rect l="l" t="t" r="r" b="b"/>
+            <a:pathLst>
+              <a:path w="3684494" h="2124436">
+                <a:moveTo>
+                  <a:pt x="0" y="2105990"/>
+                </a:moveTo>
+                <a:cubicBezTo>
+                  <a:pt x="194235" y="2120184"/>
+                  <a:pt x="388471" y="2134378"/>
+                  <a:pt x="555812" y="2114955"/>
+                </a:cubicBezTo>
+                <a:cubicBezTo>
+                  <a:pt x="723153" y="2095532"/>
+                  <a:pt x="845671" y="2080590"/>
+                  <a:pt x="1004047" y="1989449"/>
+                </a:cubicBezTo>
+                <a:cubicBezTo>
+                  <a:pt x="1162423" y="1898308"/>
+                  <a:pt x="1295400" y="1763837"/>
+                  <a:pt x="1506070" y="1568108"/>
+                </a:cubicBezTo>
+                <a:cubicBezTo>
+                  <a:pt x="1716740" y="1372379"/>
+                  <a:pt x="2039470" y="1018273"/>
+                  <a:pt x="2268070" y="815073"/>
+                </a:cubicBezTo>
+                <a:cubicBezTo>
+                  <a:pt x="2496670" y="611873"/>
+                  <a:pt x="2689411" y="477402"/>
+                  <a:pt x="2877670" y="348908"/>
+                </a:cubicBezTo>
+                <a:cubicBezTo>
+                  <a:pt x="3065929" y="220414"/>
+                  <a:pt x="3263152" y="100884"/>
+                  <a:pt x="3397623" y="44108"/>
+                </a:cubicBezTo>
+                <a:cubicBezTo>
+                  <a:pt x="3532094" y="-12668"/>
+                  <a:pt x="3608294" y="-2210"/>
+                  <a:pt x="3684494" y="8249"/>
+                </a:cubicBezTo>
+              </a:path>
+            </a:pathLst>
+          </a:custGeom>
+          <a:noFill/>
+        </p:spPr>
+        <p:style>
+          <a:lnRef idx="2">
+            <a:schemeClr val="accent1">
+              <a:shade val="50000"/>
+            </a:schemeClr>
+          </a:lnRef>
+          <a:fillRef idx="1">
+            <a:schemeClr val="accent1"/>
+          </a:fillRef>
+          <a:effectRef idx="0">
+            <a:schemeClr val="accent1"/>
+          </a:effectRef>
+          <a:fontRef idx="minor">
+            <a:schemeClr val="lt1"/>
+          </a:fontRef>
+        </p:style>
+        <p:txBody>
+          <a:bodyPr rtlCol="0" anchor="ctr"/>
+          <a:lstStyle/>
+          <a:p>
+            <a:pPr algn="ctr"/>
+            <a:endParaRPr lang="en-IN"/>
+          </a:p>
+        </p:txBody>
+      </p:sp>
+      <p:cxnSp>
+        <p:nvCxnSpPr>
+          <p:cNvPr id="10" name="Straight Connector 9">
+            <a:extLst>
+              <a:ext uri="{FF2B5EF4-FFF2-40B4-BE49-F238E27FC236}">
+                <a16:creationId xmlns:a16="http://schemas.microsoft.com/office/drawing/2014/main" id="{5E45A8E3-550A-4F6E-B706-E11872D40139}"/>
+              </a:ext>
+            </a:extLst>
+          </p:cNvPr>
+          <p:cNvCxnSpPr/>
+          <p:nvPr/>
+        </p:nvCxnSpPr>
+        <p:spPr>
+          <a:xfrm>
+            <a:off x="4616824" y="2796988"/>
+            <a:ext cx="0" cy="3003177"/>
+          </a:xfrm>
+          <a:prstGeom prst="line">
+            <a:avLst/>
+          </a:prstGeom>
+          <a:ln w="57150">
+            <a:prstDash val="sysDash"/>
+          </a:ln>
+        </p:spPr>
+        <p:style>
+          <a:lnRef idx="1">
+            <a:schemeClr val="accent1"/>
+          </a:lnRef>
+          <a:fillRef idx="0">
+            <a:schemeClr val="accent1"/>
+          </a:fillRef>
+          <a:effectRef idx="0">
+            <a:schemeClr val="accent1"/>
+          </a:effectRef>
+          <a:fontRef idx="minor">
+            <a:schemeClr val="tx1"/>
+          </a:fontRef>
+        </p:style>
+      </p:cxnSp>
+      <p:cxnSp>
+        <p:nvCxnSpPr>
+          <p:cNvPr id="13" name="Straight Connector 12">
+            <a:extLst>
+              <a:ext uri="{FF2B5EF4-FFF2-40B4-BE49-F238E27FC236}">
+                <a16:creationId xmlns:a16="http://schemas.microsoft.com/office/drawing/2014/main" id="{F960DB85-B865-4B19-A41F-62E9D96F9FDE}"/>
+              </a:ext>
+            </a:extLst>
+          </p:cNvPr>
+          <p:cNvCxnSpPr/>
+          <p:nvPr/>
+        </p:nvCxnSpPr>
+        <p:spPr>
+          <a:xfrm>
+            <a:off x="3101788" y="3334871"/>
+            <a:ext cx="0" cy="2438400"/>
+          </a:xfrm>
+          <a:prstGeom prst="line">
+            <a:avLst/>
+          </a:prstGeom>
+          <a:ln w="57150">
+            <a:prstDash val="sysDash"/>
+          </a:ln>
+        </p:spPr>
+        <p:style>
+          <a:lnRef idx="1">
+            <a:schemeClr val="accent1"/>
+          </a:lnRef>
+          <a:fillRef idx="0">
+            <a:schemeClr val="accent1"/>
+          </a:fillRef>
+          <a:effectRef idx="0">
+            <a:schemeClr val="accent1"/>
+          </a:effectRef>
+          <a:fontRef idx="minor">
+            <a:schemeClr val="tx1"/>
+          </a:fontRef>
+        </p:style>
+      </p:cxnSp>
+      <p:cxnSp>
+        <p:nvCxnSpPr>
+          <p:cNvPr id="26" name="Straight Connector 25">
+            <a:extLst>
+              <a:ext uri="{FF2B5EF4-FFF2-40B4-BE49-F238E27FC236}">
+                <a16:creationId xmlns:a16="http://schemas.microsoft.com/office/drawing/2014/main" id="{FE0B1797-C8E3-41E5-B396-C5A0CEF13B94}"/>
+              </a:ext>
+            </a:extLst>
+          </p:cNvPr>
+          <p:cNvCxnSpPr/>
+          <p:nvPr/>
+        </p:nvCxnSpPr>
+        <p:spPr>
+          <a:xfrm>
+            <a:off x="7100047" y="2770094"/>
+            <a:ext cx="0" cy="3003177"/>
+          </a:xfrm>
+          <a:prstGeom prst="line">
+            <a:avLst/>
+          </a:prstGeom>
+          <a:ln w="57150">
+            <a:prstDash val="sysDash"/>
+          </a:ln>
+        </p:spPr>
+        <p:style>
+          <a:lnRef idx="1">
+            <a:schemeClr val="accent1"/>
+          </a:lnRef>
+          <a:fillRef idx="0">
+            <a:schemeClr val="accent1"/>
+          </a:fillRef>
+          <a:effectRef idx="0">
+            <a:schemeClr val="accent1"/>
+          </a:effectRef>
+          <a:fontRef idx="minor">
+            <a:schemeClr val="tx1"/>
+          </a:fontRef>
+        </p:style>
+      </p:cxnSp>
+      <p:cxnSp>
+        <p:nvCxnSpPr>
+          <p:cNvPr id="27" name="Straight Connector 26">
+            <a:extLst>
+              <a:ext uri="{FF2B5EF4-FFF2-40B4-BE49-F238E27FC236}">
+                <a16:creationId xmlns:a16="http://schemas.microsoft.com/office/drawing/2014/main" id="{7ADED969-787C-4E85-961C-9E0F85952FF8}"/>
+              </a:ext>
+            </a:extLst>
+          </p:cNvPr>
+          <p:cNvCxnSpPr/>
+          <p:nvPr/>
+        </p:nvCxnSpPr>
+        <p:spPr>
+          <a:xfrm>
+            <a:off x="8776447" y="3334870"/>
+            <a:ext cx="0" cy="2438400"/>
+          </a:xfrm>
+          <a:prstGeom prst="line">
+            <a:avLst/>
+          </a:prstGeom>
+          <a:ln w="57150">
+            <a:prstDash val="sysDash"/>
+          </a:ln>
+        </p:spPr>
+        <p:style>
+          <a:lnRef idx="1">
+            <a:schemeClr val="accent1"/>
+          </a:lnRef>
+          <a:fillRef idx="0">
+            <a:schemeClr val="accent1"/>
+          </a:fillRef>
+          <a:effectRef idx="0">
+            <a:schemeClr val="accent1"/>
+          </a:effectRef>
+          <a:fontRef idx="minor">
+            <a:schemeClr val="tx1"/>
+          </a:fontRef>
+        </p:style>
+      </p:cxnSp>
+      <mc:AlternateContent xmlns:mc="http://schemas.openxmlformats.org/markup-compatibility/2006">
+        <mc:Choice xmlns:a14="http://schemas.microsoft.com/office/drawing/2010/main" Requires="a14">
+          <p:sp>
+            <p:nvSpPr>
+              <p:cNvPr id="15" name="TextBox 14">
+                <a:extLst>
+                  <a:ext uri="{FF2B5EF4-FFF2-40B4-BE49-F238E27FC236}">
+                    <a16:creationId xmlns:a16="http://schemas.microsoft.com/office/drawing/2014/main" id="{E74344CB-DF37-41DA-AB5D-FC9916DD987A}"/>
+                  </a:ext>
+                </a:extLst>
+              </p:cNvPr>
+              <p:cNvSpPr txBox="1"/>
+              <p:nvPr/>
+            </p:nvSpPr>
+            <p:spPr>
+              <a:xfrm>
+                <a:off x="2736784" y="5871820"/>
+                <a:ext cx="759823" cy="276999"/>
+              </a:xfrm>
+              <a:prstGeom prst="rect">
+                <a:avLst/>
+              </a:prstGeom>
+              <a:noFill/>
+            </p:spPr>
+            <p:txBody>
+              <a:bodyPr wrap="none" lIns="0" tIns="0" rIns="0" bIns="0" rtlCol="0">
+                <a:spAutoFit/>
+              </a:bodyPr>
+              <a:lstStyle/>
+              <a:p>
+                <a14:m>
+                  <m:oMathPara xmlns:m="http://schemas.openxmlformats.org/officeDocument/2006/math">
+                    <m:oMathParaPr>
+                      <m:jc m:val="centerGroup"/>
+                    </m:oMathParaPr>
+                    <m:oMath xmlns:m="http://schemas.openxmlformats.org/officeDocument/2006/math">
+                      <m:r>
+                        <a:rPr lang="en-IN" b="1" i="1" smtClean="0">
+                          <a:latin typeface="Cambria Math" panose="02040503050406030204" pitchFamily="18" charset="0"/>
+                          <a:ea typeface="Cambria Math" panose="02040503050406030204" pitchFamily="18" charset="0"/>
+                        </a:rPr>
+                        <m:t>𝝁</m:t>
+                      </m:r>
+                      <m:r>
+                        <a:rPr lang="en-US" b="1" i="1" smtClean="0">
+                          <a:latin typeface="Cambria Math" panose="02040503050406030204" pitchFamily="18" charset="0"/>
+                          <a:ea typeface="Cambria Math" panose="02040503050406030204" pitchFamily="18" charset="0"/>
+                        </a:rPr>
+                        <m:t>−</m:t>
+                      </m:r>
+                      <m:r>
+                        <a:rPr lang="en-US" b="1" i="1" smtClean="0">
+                          <a:latin typeface="Cambria Math" panose="02040503050406030204" pitchFamily="18" charset="0"/>
+                          <a:ea typeface="Cambria Math" panose="02040503050406030204" pitchFamily="18" charset="0"/>
+                        </a:rPr>
+                        <m:t>𝟐</m:t>
+                      </m:r>
+                      <m:r>
+                        <a:rPr lang="en-US" b="1" i="1" smtClean="0">
+                          <a:latin typeface="Cambria Math" panose="02040503050406030204" pitchFamily="18" charset="0"/>
+                          <a:ea typeface="Cambria Math" panose="02040503050406030204" pitchFamily="18" charset="0"/>
+                        </a:rPr>
+                        <m:t>𝝈</m:t>
+                      </m:r>
+                    </m:oMath>
+                  </m:oMathPara>
+                </a14:m>
+                <a:endParaRPr lang="en-IN" b="1"/>
+              </a:p>
+            </p:txBody>
+          </p:sp>
+        </mc:Choice>
+        <mc:Fallback>
+          <p:sp>
+            <p:nvSpPr>
+              <p:cNvPr id="15" name="TextBox 14">
+                <a:extLst>
+                  <a:ext uri="{FF2B5EF4-FFF2-40B4-BE49-F238E27FC236}">
+                    <a16:creationId xmlns:a16="http://schemas.microsoft.com/office/drawing/2014/main" id="{E74344CB-DF37-41DA-AB5D-FC9916DD987A}"/>
+                  </a:ext>
+                </a:extLst>
+              </p:cNvPr>
+              <p:cNvSpPr txBox="1">
+                <a:spLocks noRot="1" noChangeAspect="1" noMove="1" noResize="1" noEditPoints="1" noAdjustHandles="1" noChangeArrowheads="1" noChangeShapeType="1" noTextEdit="1"/>
+              </p:cNvSpPr>
+              <p:nvPr/>
+            </p:nvSpPr>
+            <p:spPr>
+              <a:xfrm>
+                <a:off x="2736784" y="5871820"/>
+                <a:ext cx="759823" cy="276999"/>
+              </a:xfrm>
+              <a:prstGeom prst="rect">
+                <a:avLst/>
+              </a:prstGeom>
+              <a:blipFill>
+                <a:blip r:embed="rId4"/>
+                <a:stretch>
+                  <a:fillRect l="-7200" r="-7200" b="-21739"/>
+                </a:stretch>
+              </a:blipFill>
+            </p:spPr>
+            <p:txBody>
+              <a:bodyPr/>
+              <a:lstStyle/>
+              <a:p>
+                <a:r>
+                  <a:rPr lang="en-IN">
+                    <a:noFill/>
+                  </a:rPr>
+                  <a:t> </a:t>
+                </a:r>
+              </a:p>
+            </p:txBody>
+          </p:sp>
+        </mc:Fallback>
+      </mc:AlternateContent>
+      <mc:AlternateContent xmlns:mc="http://schemas.openxmlformats.org/markup-compatibility/2006">
+        <mc:Choice xmlns:a14="http://schemas.microsoft.com/office/drawing/2010/main" Requires="a14">
+          <p:sp>
+            <p:nvSpPr>
+              <p:cNvPr id="28" name="TextBox 27">
+                <a:extLst>
+                  <a:ext uri="{FF2B5EF4-FFF2-40B4-BE49-F238E27FC236}">
+                    <a16:creationId xmlns:a16="http://schemas.microsoft.com/office/drawing/2014/main" id="{143332D7-CC9C-4085-A5AA-B79E1E919F17}"/>
+                  </a:ext>
+                </a:extLst>
+              </p:cNvPr>
+              <p:cNvSpPr txBox="1"/>
+              <p:nvPr/>
+            </p:nvSpPr>
+            <p:spPr>
+              <a:xfrm>
+                <a:off x="8396535" y="5871820"/>
+                <a:ext cx="759823" cy="276999"/>
+              </a:xfrm>
+              <a:prstGeom prst="rect">
+                <a:avLst/>
+              </a:prstGeom>
+              <a:noFill/>
+            </p:spPr>
+            <p:txBody>
+              <a:bodyPr wrap="none" lIns="0" tIns="0" rIns="0" bIns="0" rtlCol="0">
+                <a:spAutoFit/>
+              </a:bodyPr>
+              <a:lstStyle/>
+              <a:p>
+                <a14:m>
+                  <m:oMathPara xmlns:m="http://schemas.openxmlformats.org/officeDocument/2006/math">
+                    <m:oMathParaPr>
+                      <m:jc m:val="centerGroup"/>
+                    </m:oMathParaPr>
+                    <m:oMath xmlns:m="http://schemas.openxmlformats.org/officeDocument/2006/math">
+                      <m:r>
+                        <a:rPr lang="en-IN" b="1" i="1" smtClean="0">
+                          <a:latin typeface="Cambria Math" panose="02040503050406030204" pitchFamily="18" charset="0"/>
+                          <a:ea typeface="Cambria Math" panose="02040503050406030204" pitchFamily="18" charset="0"/>
+                        </a:rPr>
+                        <m:t>𝝁</m:t>
+                      </m:r>
+                      <m:r>
+                        <a:rPr lang="en-US" b="1" i="1" smtClean="0">
+                          <a:latin typeface="Cambria Math" panose="02040503050406030204" pitchFamily="18" charset="0"/>
+                          <a:ea typeface="Cambria Math" panose="02040503050406030204" pitchFamily="18" charset="0"/>
+                        </a:rPr>
+                        <m:t>+</m:t>
+                      </m:r>
+                      <m:r>
+                        <a:rPr lang="en-US" b="1" i="1" smtClean="0">
+                          <a:latin typeface="Cambria Math" panose="02040503050406030204" pitchFamily="18" charset="0"/>
+                          <a:ea typeface="Cambria Math" panose="02040503050406030204" pitchFamily="18" charset="0"/>
+                        </a:rPr>
+                        <m:t>𝟐</m:t>
+                      </m:r>
+                      <m:r>
+                        <a:rPr lang="en-US" b="1" i="1" smtClean="0">
+                          <a:latin typeface="Cambria Math" panose="02040503050406030204" pitchFamily="18" charset="0"/>
+                          <a:ea typeface="Cambria Math" panose="02040503050406030204" pitchFamily="18" charset="0"/>
+                        </a:rPr>
+                        <m:t>𝝈</m:t>
+                      </m:r>
+                    </m:oMath>
+                  </m:oMathPara>
+                </a14:m>
+                <a:endParaRPr lang="en-IN" b="1"/>
+              </a:p>
+            </p:txBody>
+          </p:sp>
+        </mc:Choice>
+        <mc:Fallback>
+          <p:sp>
+            <p:nvSpPr>
+              <p:cNvPr id="28" name="TextBox 27">
+                <a:extLst>
+                  <a:ext uri="{FF2B5EF4-FFF2-40B4-BE49-F238E27FC236}">
+                    <a16:creationId xmlns:a16="http://schemas.microsoft.com/office/drawing/2014/main" id="{143332D7-CC9C-4085-A5AA-B79E1E919F17}"/>
+                  </a:ext>
+                </a:extLst>
+              </p:cNvPr>
+              <p:cNvSpPr txBox="1">
+                <a:spLocks noRot="1" noChangeAspect="1" noMove="1" noResize="1" noEditPoints="1" noAdjustHandles="1" noChangeArrowheads="1" noChangeShapeType="1" noTextEdit="1"/>
+              </p:cNvSpPr>
+              <p:nvPr/>
+            </p:nvSpPr>
+            <p:spPr>
+              <a:xfrm>
+                <a:off x="8396535" y="5871820"/>
+                <a:ext cx="759823" cy="276999"/>
+              </a:xfrm>
+              <a:prstGeom prst="rect">
+                <a:avLst/>
+              </a:prstGeom>
+              <a:blipFill>
+                <a:blip r:embed="rId5"/>
+                <a:stretch>
+                  <a:fillRect l="-6400" r="-8000" b="-21739"/>
+                </a:stretch>
+              </a:blipFill>
+            </p:spPr>
+            <p:txBody>
+              <a:bodyPr/>
+              <a:lstStyle/>
+              <a:p>
+                <a:r>
+                  <a:rPr lang="en-IN">
+                    <a:noFill/>
+                  </a:rPr>
+                  <a:t> </a:t>
+                </a:r>
+              </a:p>
+            </p:txBody>
+          </p:sp>
+        </mc:Fallback>
+      </mc:AlternateContent>
+      <mc:AlternateContent xmlns:mc="http://schemas.openxmlformats.org/markup-compatibility/2006">
+        <mc:Choice xmlns:a14="http://schemas.microsoft.com/office/drawing/2010/main" Requires="a14">
+          <p:sp>
+            <p:nvSpPr>
+              <p:cNvPr id="29" name="TextBox 28">
+                <a:extLst>
+                  <a:ext uri="{FF2B5EF4-FFF2-40B4-BE49-F238E27FC236}">
+                    <a16:creationId xmlns:a16="http://schemas.microsoft.com/office/drawing/2014/main" id="{32A74F75-BBA6-41DD-A72C-FCB8E9621A9D}"/>
+                  </a:ext>
+                </a:extLst>
+              </p:cNvPr>
+              <p:cNvSpPr txBox="1"/>
+              <p:nvPr/>
+            </p:nvSpPr>
+            <p:spPr>
+              <a:xfrm>
+                <a:off x="4236912" y="5861886"/>
+                <a:ext cx="621965" cy="276999"/>
+              </a:xfrm>
+              <a:prstGeom prst="rect">
+                <a:avLst/>
+              </a:prstGeom>
+              <a:noFill/>
+            </p:spPr>
+            <p:txBody>
+              <a:bodyPr wrap="none" lIns="0" tIns="0" rIns="0" bIns="0" rtlCol="0">
+                <a:spAutoFit/>
+              </a:bodyPr>
+              <a:lstStyle/>
+              <a:p>
+                <a14:m>
+                  <m:oMathPara xmlns:m="http://schemas.openxmlformats.org/officeDocument/2006/math">
+                    <m:oMathParaPr>
+                      <m:jc m:val="centerGroup"/>
+                    </m:oMathParaPr>
+                    <m:oMath xmlns:m="http://schemas.openxmlformats.org/officeDocument/2006/math">
+                      <m:r>
+                        <a:rPr lang="en-IN" b="1" i="1" smtClean="0">
+                          <a:latin typeface="Cambria Math" panose="02040503050406030204" pitchFamily="18" charset="0"/>
+                          <a:ea typeface="Cambria Math" panose="02040503050406030204" pitchFamily="18" charset="0"/>
+                        </a:rPr>
+                        <m:t>𝝁</m:t>
+                      </m:r>
+                      <m:r>
+                        <a:rPr lang="en-US" b="1" i="1" smtClean="0">
+                          <a:latin typeface="Cambria Math" panose="02040503050406030204" pitchFamily="18" charset="0"/>
+                          <a:ea typeface="Cambria Math" panose="02040503050406030204" pitchFamily="18" charset="0"/>
+                        </a:rPr>
+                        <m:t>−</m:t>
+                      </m:r>
+                      <m:r>
+                        <a:rPr lang="en-US" b="1" i="1" smtClean="0">
+                          <a:latin typeface="Cambria Math" panose="02040503050406030204" pitchFamily="18" charset="0"/>
+                          <a:ea typeface="Cambria Math" panose="02040503050406030204" pitchFamily="18" charset="0"/>
+                        </a:rPr>
+                        <m:t>𝝈</m:t>
+                      </m:r>
+                    </m:oMath>
+                  </m:oMathPara>
+                </a14:m>
+                <a:endParaRPr lang="en-IN" b="1"/>
+              </a:p>
+            </p:txBody>
+          </p:sp>
+        </mc:Choice>
+        <mc:Fallback>
+          <p:sp>
+            <p:nvSpPr>
+              <p:cNvPr id="29" name="TextBox 28">
+                <a:extLst>
+                  <a:ext uri="{FF2B5EF4-FFF2-40B4-BE49-F238E27FC236}">
+                    <a16:creationId xmlns:a16="http://schemas.microsoft.com/office/drawing/2014/main" id="{32A74F75-BBA6-41DD-A72C-FCB8E9621A9D}"/>
+                  </a:ext>
+                </a:extLst>
+              </p:cNvPr>
+              <p:cNvSpPr txBox="1">
+                <a:spLocks noRot="1" noChangeAspect="1" noMove="1" noResize="1" noEditPoints="1" noAdjustHandles="1" noChangeArrowheads="1" noChangeShapeType="1" noTextEdit="1"/>
+              </p:cNvSpPr>
+              <p:nvPr/>
+            </p:nvSpPr>
+            <p:spPr>
+              <a:xfrm>
+                <a:off x="4236912" y="5861886"/>
+                <a:ext cx="621965" cy="276999"/>
+              </a:xfrm>
+              <a:prstGeom prst="rect">
+                <a:avLst/>
+              </a:prstGeom>
+              <a:blipFill>
+                <a:blip r:embed="rId6"/>
+                <a:stretch>
+                  <a:fillRect l="-7843" r="-4902" b="-22222"/>
+                </a:stretch>
+              </a:blipFill>
+            </p:spPr>
+            <p:txBody>
+              <a:bodyPr/>
+              <a:lstStyle/>
+              <a:p>
+                <a:r>
+                  <a:rPr lang="en-IN">
+                    <a:noFill/>
+                  </a:rPr>
+                  <a:t> </a:t>
+                </a:r>
+              </a:p>
+            </p:txBody>
+          </p:sp>
+        </mc:Fallback>
+      </mc:AlternateContent>
+      <mc:AlternateContent xmlns:mc="http://schemas.openxmlformats.org/markup-compatibility/2006">
+        <mc:Choice xmlns:a14="http://schemas.microsoft.com/office/drawing/2010/main" Requires="a14">
+          <p:sp>
+            <p:nvSpPr>
+              <p:cNvPr id="33" name="TextBox 32">
+                <a:extLst>
+                  <a:ext uri="{FF2B5EF4-FFF2-40B4-BE49-F238E27FC236}">
+                    <a16:creationId xmlns:a16="http://schemas.microsoft.com/office/drawing/2014/main" id="{1D04CBDA-4EE4-4873-BA2D-A1E15AFB6DB9}"/>
+                  </a:ext>
+                </a:extLst>
+              </p:cNvPr>
+              <p:cNvSpPr txBox="1"/>
+              <p:nvPr/>
+            </p:nvSpPr>
+            <p:spPr>
+              <a:xfrm>
+                <a:off x="6720135" y="5871820"/>
+                <a:ext cx="621965" cy="276999"/>
+              </a:xfrm>
+              <a:prstGeom prst="rect">
+                <a:avLst/>
+              </a:prstGeom>
+              <a:noFill/>
+            </p:spPr>
+            <p:txBody>
+              <a:bodyPr wrap="none" lIns="0" tIns="0" rIns="0" bIns="0" rtlCol="0">
+                <a:spAutoFit/>
+              </a:bodyPr>
+              <a:lstStyle/>
+              <a:p>
+                <a14:m>
+                  <m:oMathPara xmlns:m="http://schemas.openxmlformats.org/officeDocument/2006/math">
+                    <m:oMathParaPr>
+                      <m:jc m:val="centerGroup"/>
+                    </m:oMathParaPr>
+                    <m:oMath xmlns:m="http://schemas.openxmlformats.org/officeDocument/2006/math">
+                      <m:r>
+                        <a:rPr lang="en-IN" b="1" i="1" smtClean="0">
+                          <a:latin typeface="Cambria Math" panose="02040503050406030204" pitchFamily="18" charset="0"/>
+                          <a:ea typeface="Cambria Math" panose="02040503050406030204" pitchFamily="18" charset="0"/>
+                        </a:rPr>
+                        <m:t>𝝁</m:t>
+                      </m:r>
+                      <m:r>
+                        <a:rPr lang="en-US" b="1" i="1" smtClean="0">
+                          <a:latin typeface="Cambria Math" panose="02040503050406030204" pitchFamily="18" charset="0"/>
+                          <a:ea typeface="Cambria Math" panose="02040503050406030204" pitchFamily="18" charset="0"/>
+                        </a:rPr>
+                        <m:t>+</m:t>
+                      </m:r>
+                      <m:r>
+                        <a:rPr lang="en-US" b="1" i="1" smtClean="0">
+                          <a:latin typeface="Cambria Math" panose="02040503050406030204" pitchFamily="18" charset="0"/>
+                          <a:ea typeface="Cambria Math" panose="02040503050406030204" pitchFamily="18" charset="0"/>
+                        </a:rPr>
+                        <m:t>𝝈</m:t>
+                      </m:r>
+                    </m:oMath>
+                  </m:oMathPara>
+                </a14:m>
+                <a:endParaRPr lang="en-IN" b="1"/>
+              </a:p>
+            </p:txBody>
+          </p:sp>
+        </mc:Choice>
+        <mc:Fallback>
+          <p:sp>
+            <p:nvSpPr>
+              <p:cNvPr id="33" name="TextBox 32">
+                <a:extLst>
+                  <a:ext uri="{FF2B5EF4-FFF2-40B4-BE49-F238E27FC236}">
+                    <a16:creationId xmlns:a16="http://schemas.microsoft.com/office/drawing/2014/main" id="{1D04CBDA-4EE4-4873-BA2D-A1E15AFB6DB9}"/>
+                  </a:ext>
+                </a:extLst>
+              </p:cNvPr>
+              <p:cNvSpPr txBox="1">
+                <a:spLocks noRot="1" noChangeAspect="1" noMove="1" noResize="1" noEditPoints="1" noAdjustHandles="1" noChangeArrowheads="1" noChangeShapeType="1" noTextEdit="1"/>
+              </p:cNvSpPr>
+              <p:nvPr/>
+            </p:nvSpPr>
+            <p:spPr>
+              <a:xfrm>
+                <a:off x="6720135" y="5871820"/>
+                <a:ext cx="621965" cy="276999"/>
+              </a:xfrm>
+              <a:prstGeom prst="rect">
+                <a:avLst/>
+              </a:prstGeom>
+              <a:blipFill>
+                <a:blip r:embed="rId7"/>
+                <a:stretch>
+                  <a:fillRect l="-7843" r="-4902" b="-21739"/>
+                </a:stretch>
+              </a:blipFill>
+            </p:spPr>
+            <p:txBody>
+              <a:bodyPr/>
+              <a:lstStyle/>
+              <a:p>
+                <a:r>
+                  <a:rPr lang="en-IN">
+                    <a:noFill/>
+                  </a:rPr>
+                  <a:t> </a:t>
+                </a:r>
+              </a:p>
+            </p:txBody>
+          </p:sp>
+        </mc:Fallback>
+      </mc:AlternateContent>
+      <mc:AlternateContent xmlns:mc="http://schemas.openxmlformats.org/markup-compatibility/2006">
+        <mc:Choice xmlns:a14="http://schemas.microsoft.com/office/drawing/2010/main" Requires="a14">
+          <p:sp>
+            <p:nvSpPr>
+              <p:cNvPr id="36" name="TextBox 35">
+                <a:extLst>
+                  <a:ext uri="{FF2B5EF4-FFF2-40B4-BE49-F238E27FC236}">
+                    <a16:creationId xmlns:a16="http://schemas.microsoft.com/office/drawing/2014/main" id="{BBAF2BA2-B732-400F-8DBB-A762CBDDB6AF}"/>
+                  </a:ext>
+                </a:extLst>
+              </p:cNvPr>
+              <p:cNvSpPr txBox="1"/>
+              <p:nvPr/>
+            </p:nvSpPr>
+            <p:spPr>
+              <a:xfrm>
+                <a:off x="5206070" y="5239871"/>
+                <a:ext cx="1419037" cy="400110"/>
+              </a:xfrm>
+              <a:prstGeom prst="rect">
+                <a:avLst/>
+              </a:prstGeom>
+              <a:noFill/>
+            </p:spPr>
+            <p:txBody>
+              <a:bodyPr wrap="square" rtlCol="0">
+                <a:spAutoFit/>
+              </a:bodyPr>
+              <a:lstStyle/>
+              <a:p>
+                <a:pPr algn="ctr"/>
+                <a14:m>
+                  <m:oMathPara xmlns:m="http://schemas.openxmlformats.org/officeDocument/2006/math">
+                    <m:oMathParaPr>
+                      <m:jc m:val="centerGroup"/>
+                    </m:oMathParaPr>
+                    <m:oMath xmlns:m="http://schemas.openxmlformats.org/officeDocument/2006/math">
+                      <m:r>
+                        <a:rPr lang="en-US" sz="2000" b="1" i="1" smtClean="0">
+                          <a:latin typeface="Cambria Math" panose="02040503050406030204" pitchFamily="18" charset="0"/>
+                        </a:rPr>
+                        <m:t>𝑿</m:t>
+                      </m:r>
+                      <m:r>
+                        <a:rPr lang="en-US" sz="2000" b="1" i="1" smtClean="0">
+                          <a:latin typeface="Cambria Math" panose="02040503050406030204" pitchFamily="18" charset="0"/>
+                        </a:rPr>
+                        <m:t>= </m:t>
+                      </m:r>
+                      <m:r>
+                        <a:rPr lang="en-US" sz="2000" b="1" i="1" smtClean="0">
+                          <a:latin typeface="Cambria Math" panose="02040503050406030204" pitchFamily="18" charset="0"/>
+                          <a:ea typeface="Cambria Math" panose="02040503050406030204" pitchFamily="18" charset="0"/>
+                        </a:rPr>
+                        <m:t>𝝁</m:t>
+                      </m:r>
+                    </m:oMath>
+                  </m:oMathPara>
+                </a14:m>
+                <a:endParaRPr lang="en-IN" sz="2000" b="1"/>
+              </a:p>
+            </p:txBody>
+          </p:sp>
+        </mc:Choice>
+        <mc:Fallback>
+          <p:sp>
+            <p:nvSpPr>
+              <p:cNvPr id="36" name="TextBox 35">
+                <a:extLst>
+                  <a:ext uri="{FF2B5EF4-FFF2-40B4-BE49-F238E27FC236}">
+                    <a16:creationId xmlns:a16="http://schemas.microsoft.com/office/drawing/2014/main" id="{BBAF2BA2-B732-400F-8DBB-A762CBDDB6AF}"/>
+                  </a:ext>
+                </a:extLst>
+              </p:cNvPr>
+              <p:cNvSpPr txBox="1">
+                <a:spLocks noRot="1" noChangeAspect="1" noMove="1" noResize="1" noEditPoints="1" noAdjustHandles="1" noChangeArrowheads="1" noChangeShapeType="1" noTextEdit="1"/>
+              </p:cNvSpPr>
+              <p:nvPr/>
+            </p:nvSpPr>
+            <p:spPr>
+              <a:xfrm>
+                <a:off x="5206070" y="5239871"/>
+                <a:ext cx="1419037" cy="400110"/>
+              </a:xfrm>
+              <a:prstGeom prst="rect">
+                <a:avLst/>
+              </a:prstGeom>
+              <a:blipFill>
+                <a:blip r:embed="rId8"/>
+                <a:stretch>
+                  <a:fillRect b="-6154"/>
+                </a:stretch>
+              </a:blipFill>
+            </p:spPr>
+            <p:txBody>
+              <a:bodyPr/>
+              <a:lstStyle/>
+              <a:p>
+                <a:r>
+                  <a:rPr lang="en-IN">
+                    <a:noFill/>
+                  </a:rPr>
+                  <a:t> </a:t>
+                </a:r>
+              </a:p>
+            </p:txBody>
+          </p:sp>
+        </mc:Fallback>
+      </mc:AlternateContent>
+    </p:spTree>
+    <p:extLst>
+      <p:ext uri="{BB962C8B-B14F-4D97-AF65-F5344CB8AC3E}">
+        <p14:creationId xmlns:p14="http://schemas.microsoft.com/office/powerpoint/2010/main" val="1233084467"/>
+      </p:ext>
+    </p:extLst>
+  </p:cSld>
+  <p:clrMapOvr>
+    <a:masterClrMapping/>
+  </p:clrMapOvr>
+</p:sld>
+</file>
+
+<file path=ppt/slides/slide5.xml><?xml version="1.0" encoding="utf-8"?>
+<p:sld xmlns:a="http://schemas.openxmlformats.org/drawingml/2006/main" xmlns:r="http://schemas.openxmlformats.org/officeDocument/2006/relationships" xmlns:p="http://schemas.openxmlformats.org/presentationml/2006/main">
+  <p:cSld>
+    <p:spTree>
+      <p:nvGrpSpPr>
+        <p:cNvPr id="1" name=""/>
+        <p:cNvGrpSpPr/>
+        <p:nvPr/>
+      </p:nvGrpSpPr>
+      <p:grpSpPr>
+        <a:xfrm>
+          <a:off x="0" y="0"/>
+          <a:ext cx="0" cy="0"/>
+          <a:chOff x="0" y="0"/>
+          <a:chExt cx="0" cy="0"/>
+        </a:xfrm>
+      </p:grpSpPr>
+      <p:cxnSp>
+        <p:nvCxnSpPr>
+          <p:cNvPr id="17" name="Straight Arrow Connector 16">
+            <a:extLst>
+              <a:ext uri="{FF2B5EF4-FFF2-40B4-BE49-F238E27FC236}">
+                <a16:creationId xmlns:a16="http://schemas.microsoft.com/office/drawing/2014/main" id="{32715239-3C14-46D1-8224-F6C51B093DB1}"/>
+              </a:ext>
+            </a:extLst>
+          </p:cNvPr>
+          <p:cNvCxnSpPr>
+            <a:cxnSpLocks/>
+          </p:cNvCxnSpPr>
+          <p:nvPr/>
+        </p:nvCxnSpPr>
+        <p:spPr>
+          <a:xfrm flipV="1">
+            <a:off x="495785" y="523220"/>
+            <a:ext cx="0" cy="2958354"/>
+          </a:xfrm>
+          <a:prstGeom prst="straightConnector1">
+            <a:avLst/>
+          </a:prstGeom>
+          <a:ln w="57150">
+            <a:tailEnd type="triangle"/>
+          </a:ln>
+        </p:spPr>
+        <p:style>
+          <a:lnRef idx="1">
+            <a:schemeClr val="dk1"/>
+          </a:lnRef>
+          <a:fillRef idx="0">
+            <a:schemeClr val="dk1"/>
+          </a:fillRef>
+          <a:effectRef idx="0">
+            <a:schemeClr val="dk1"/>
+          </a:effectRef>
+          <a:fontRef idx="minor">
+            <a:schemeClr val="tx1"/>
+          </a:fontRef>
+        </p:style>
+      </p:cxnSp>
+      <p:cxnSp>
+        <p:nvCxnSpPr>
+          <p:cNvPr id="18" name="Straight Arrow Connector 17">
+            <a:extLst>
+              <a:ext uri="{FF2B5EF4-FFF2-40B4-BE49-F238E27FC236}">
+                <a16:creationId xmlns:a16="http://schemas.microsoft.com/office/drawing/2014/main" id="{429112B1-64CF-4F18-9598-AE6E8AD1D601}"/>
+              </a:ext>
+            </a:extLst>
+          </p:cNvPr>
+          <p:cNvCxnSpPr>
+            <a:cxnSpLocks/>
+          </p:cNvCxnSpPr>
+          <p:nvPr/>
+        </p:nvCxnSpPr>
+        <p:spPr>
+          <a:xfrm>
+            <a:off x="495785" y="3454680"/>
+            <a:ext cx="3296286" cy="0"/>
+          </a:xfrm>
+          <a:prstGeom prst="straightConnector1">
+            <a:avLst/>
+          </a:prstGeom>
+          <a:ln w="57150">
+            <a:tailEnd type="triangle"/>
+          </a:ln>
+        </p:spPr>
+        <p:style>
+          <a:lnRef idx="1">
+            <a:schemeClr val="dk1"/>
+          </a:lnRef>
+          <a:fillRef idx="0">
+            <a:schemeClr val="dk1"/>
+          </a:fillRef>
+          <a:effectRef idx="0">
+            <a:schemeClr val="dk1"/>
+          </a:effectRef>
+          <a:fontRef idx="minor">
+            <a:schemeClr val="tx1"/>
+          </a:fontRef>
+        </p:style>
+      </p:cxnSp>
+      <mc:AlternateContent xmlns:mc="http://schemas.openxmlformats.org/markup-compatibility/2006">
+        <mc:Choice xmlns:a14="http://schemas.microsoft.com/office/drawing/2010/main" Requires="a14">
+          <p:sp>
+            <p:nvSpPr>
+              <p:cNvPr id="21" name="TextBox 20">
+                <a:extLst>
+                  <a:ext uri="{FF2B5EF4-FFF2-40B4-BE49-F238E27FC236}">
+                    <a16:creationId xmlns:a16="http://schemas.microsoft.com/office/drawing/2014/main" id="{86F428AA-C245-428E-8683-79908880F7A0}"/>
+                  </a:ext>
+                </a:extLst>
+              </p:cNvPr>
+              <p:cNvSpPr txBox="1"/>
+              <p:nvPr/>
+            </p:nvSpPr>
+            <p:spPr>
+              <a:xfrm>
+                <a:off x="327211" y="0"/>
+                <a:ext cx="475132" cy="523220"/>
+              </a:xfrm>
+              <a:prstGeom prst="rect">
+                <a:avLst/>
+              </a:prstGeom>
+              <a:noFill/>
+            </p:spPr>
+            <p:txBody>
+              <a:bodyPr wrap="square" rtlCol="0">
+                <a:spAutoFit/>
+              </a:bodyPr>
+              <a:lstStyle/>
+              <a:p>
+                <a:pPr algn="ctr"/>
+                <a14:m>
+                  <m:oMathPara xmlns:m="http://schemas.openxmlformats.org/officeDocument/2006/math">
+                    <m:oMathParaPr>
+                      <m:jc m:val="centerGroup"/>
+                    </m:oMathParaPr>
+                    <m:oMath xmlns:m="http://schemas.openxmlformats.org/officeDocument/2006/math">
+                      <m:r>
+                        <a:rPr lang="en-US" sz="2800" b="1" i="1" smtClean="0">
+                          <a:latin typeface="Cambria Math" panose="02040503050406030204" pitchFamily="18" charset="0"/>
+                        </a:rPr>
+                        <m:t>𝒚</m:t>
+                      </m:r>
+                    </m:oMath>
+                  </m:oMathPara>
+                </a14:m>
+                <a:endParaRPr lang="en-IN" sz="2800" b="1"/>
+              </a:p>
+            </p:txBody>
+          </p:sp>
+        </mc:Choice>
+        <mc:Fallback>
+          <p:sp>
+            <p:nvSpPr>
+              <p:cNvPr id="21" name="TextBox 20">
+                <a:extLst>
+                  <a:ext uri="{FF2B5EF4-FFF2-40B4-BE49-F238E27FC236}">
+                    <a16:creationId xmlns:a16="http://schemas.microsoft.com/office/drawing/2014/main" id="{86F428AA-C245-428E-8683-79908880F7A0}"/>
+                  </a:ext>
+                </a:extLst>
+              </p:cNvPr>
+              <p:cNvSpPr txBox="1">
+                <a:spLocks noRot="1" noChangeAspect="1" noMove="1" noResize="1" noEditPoints="1" noAdjustHandles="1" noChangeArrowheads="1" noChangeShapeType="1" noTextEdit="1"/>
+              </p:cNvSpPr>
+              <p:nvPr/>
+            </p:nvSpPr>
+            <p:spPr>
+              <a:xfrm>
+                <a:off x="327211" y="0"/>
+                <a:ext cx="475132" cy="523220"/>
+              </a:xfrm>
+              <a:prstGeom prst="rect">
+                <a:avLst/>
+              </a:prstGeom>
+              <a:blipFill>
+                <a:blip r:embed="rId2"/>
+                <a:stretch>
+                  <a:fillRect/>
+                </a:stretch>
+              </a:blipFill>
+            </p:spPr>
+            <p:txBody>
+              <a:bodyPr/>
+              <a:lstStyle/>
+              <a:p>
+                <a:r>
+                  <a:rPr lang="en-IN">
+                    <a:noFill/>
+                  </a:rPr>
+                  <a:t> </a:t>
+                </a:r>
+              </a:p>
+            </p:txBody>
+          </p:sp>
+        </mc:Fallback>
+      </mc:AlternateContent>
+      <mc:AlternateContent xmlns:mc="http://schemas.openxmlformats.org/markup-compatibility/2006">
+        <mc:Choice xmlns:a14="http://schemas.microsoft.com/office/drawing/2010/main" Requires="a14">
+          <p:sp>
+            <p:nvSpPr>
+              <p:cNvPr id="23" name="TextBox 22">
+                <a:extLst>
+                  <a:ext uri="{FF2B5EF4-FFF2-40B4-BE49-F238E27FC236}">
+                    <a16:creationId xmlns:a16="http://schemas.microsoft.com/office/drawing/2014/main" id="{B7774157-B4C8-4810-AFA0-8E1A0B1F0A68}"/>
+                  </a:ext>
+                </a:extLst>
+              </p:cNvPr>
+              <p:cNvSpPr txBox="1"/>
+              <p:nvPr/>
+            </p:nvSpPr>
+            <p:spPr>
+              <a:xfrm>
+                <a:off x="3706899" y="3166175"/>
+                <a:ext cx="475125" cy="523220"/>
+              </a:xfrm>
+              <a:prstGeom prst="rect">
+                <a:avLst/>
+              </a:prstGeom>
+              <a:noFill/>
+            </p:spPr>
+            <p:txBody>
+              <a:bodyPr wrap="square" rtlCol="0">
+                <a:spAutoFit/>
+              </a:bodyPr>
+              <a:lstStyle/>
+              <a:p>
+                <a:pPr algn="ctr"/>
+                <a14:m>
+                  <m:oMathPara xmlns:m="http://schemas.openxmlformats.org/officeDocument/2006/math">
+                    <m:oMathParaPr>
+                      <m:jc m:val="centerGroup"/>
+                    </m:oMathParaPr>
+                    <m:oMath xmlns:m="http://schemas.openxmlformats.org/officeDocument/2006/math">
+                      <m:r>
+                        <a:rPr lang="en-US" sz="2800" b="1" i="1" smtClean="0">
+                          <a:latin typeface="Cambria Math" panose="02040503050406030204" pitchFamily="18" charset="0"/>
+                        </a:rPr>
+                        <m:t>𝒙</m:t>
+                      </m:r>
+                    </m:oMath>
+                  </m:oMathPara>
+                </a14:m>
+                <a:endParaRPr lang="en-IN" sz="2800" b="1"/>
+              </a:p>
+            </p:txBody>
+          </p:sp>
+        </mc:Choice>
+        <mc:Fallback>
+          <p:sp>
+            <p:nvSpPr>
+              <p:cNvPr id="23" name="TextBox 22">
+                <a:extLst>
+                  <a:ext uri="{FF2B5EF4-FFF2-40B4-BE49-F238E27FC236}">
+                    <a16:creationId xmlns:a16="http://schemas.microsoft.com/office/drawing/2014/main" id="{B7774157-B4C8-4810-AFA0-8E1A0B1F0A68}"/>
+                  </a:ext>
+                </a:extLst>
+              </p:cNvPr>
+              <p:cNvSpPr txBox="1">
+                <a:spLocks noRot="1" noChangeAspect="1" noMove="1" noResize="1" noEditPoints="1" noAdjustHandles="1" noChangeArrowheads="1" noChangeShapeType="1" noTextEdit="1"/>
+              </p:cNvSpPr>
+              <p:nvPr/>
+            </p:nvSpPr>
+            <p:spPr>
+              <a:xfrm>
+                <a:off x="3706899" y="3166175"/>
+                <a:ext cx="475125" cy="523220"/>
+              </a:xfrm>
+              <a:prstGeom prst="rect">
+                <a:avLst/>
+              </a:prstGeom>
+              <a:blipFill>
+                <a:blip r:embed="rId3"/>
+                <a:stretch>
+                  <a:fillRect/>
+                </a:stretch>
+              </a:blipFill>
+            </p:spPr>
+            <p:txBody>
+              <a:bodyPr/>
+              <a:lstStyle/>
+              <a:p>
+                <a:r>
+                  <a:rPr lang="en-IN">
+                    <a:noFill/>
+                  </a:rPr>
+                  <a:t> </a:t>
+                </a:r>
+              </a:p>
+            </p:txBody>
+          </p:sp>
+        </mc:Fallback>
+      </mc:AlternateContent>
+      <p:cxnSp>
+        <p:nvCxnSpPr>
+          <p:cNvPr id="8" name="Straight Connector 7">
+            <a:extLst>
+              <a:ext uri="{FF2B5EF4-FFF2-40B4-BE49-F238E27FC236}">
+                <a16:creationId xmlns:a16="http://schemas.microsoft.com/office/drawing/2014/main" id="{0FF52C70-217A-429E-910F-DC79248E1A73}"/>
+              </a:ext>
+            </a:extLst>
+          </p:cNvPr>
+          <p:cNvCxnSpPr/>
+          <p:nvPr/>
+        </p:nvCxnSpPr>
+        <p:spPr>
+          <a:xfrm flipV="1">
+            <a:off x="959224" y="1290918"/>
+            <a:ext cx="1703294" cy="1676400"/>
+          </a:xfrm>
+          <a:prstGeom prst="line">
+            <a:avLst/>
+          </a:prstGeom>
+          <a:ln w="152400"/>
+        </p:spPr>
+        <p:style>
+          <a:lnRef idx="1">
+            <a:schemeClr val="accent1"/>
+          </a:lnRef>
+          <a:fillRef idx="0">
+            <a:schemeClr val="accent1"/>
+          </a:fillRef>
+          <a:effectRef idx="0">
+            <a:schemeClr val="accent1"/>
+          </a:effectRef>
+          <a:fontRef idx="minor">
+            <a:schemeClr val="tx1"/>
+          </a:fontRef>
+        </p:style>
+      </p:cxnSp>
+      <p:cxnSp>
+        <p:nvCxnSpPr>
+          <p:cNvPr id="30" name="Straight Arrow Connector 29">
+            <a:extLst>
+              <a:ext uri="{FF2B5EF4-FFF2-40B4-BE49-F238E27FC236}">
+                <a16:creationId xmlns:a16="http://schemas.microsoft.com/office/drawing/2014/main" id="{29D5D515-3FA4-414E-B3CB-9BE0A90A0077}"/>
+              </a:ext>
+            </a:extLst>
+          </p:cNvPr>
+          <p:cNvCxnSpPr>
+            <a:cxnSpLocks/>
+          </p:cNvCxnSpPr>
+          <p:nvPr/>
+        </p:nvCxnSpPr>
+        <p:spPr>
+          <a:xfrm flipV="1">
+            <a:off x="4255509" y="523220"/>
+            <a:ext cx="0" cy="2958354"/>
+          </a:xfrm>
+          <a:prstGeom prst="straightConnector1">
+            <a:avLst/>
+          </a:prstGeom>
+          <a:ln w="57150">
+            <a:tailEnd type="triangle"/>
+          </a:ln>
+        </p:spPr>
+        <p:style>
+          <a:lnRef idx="1">
+            <a:schemeClr val="dk1"/>
+          </a:lnRef>
+          <a:fillRef idx="0">
+            <a:schemeClr val="dk1"/>
+          </a:fillRef>
+          <a:effectRef idx="0">
+            <a:schemeClr val="dk1"/>
+          </a:effectRef>
+          <a:fontRef idx="minor">
+            <a:schemeClr val="tx1"/>
+          </a:fontRef>
+        </p:style>
+      </p:cxnSp>
+      <p:cxnSp>
+        <p:nvCxnSpPr>
+          <p:cNvPr id="31" name="Straight Arrow Connector 30">
+            <a:extLst>
+              <a:ext uri="{FF2B5EF4-FFF2-40B4-BE49-F238E27FC236}">
+                <a16:creationId xmlns:a16="http://schemas.microsoft.com/office/drawing/2014/main" id="{371CEC51-0B87-450F-927D-77B02EAA9CED}"/>
+              </a:ext>
+            </a:extLst>
+          </p:cNvPr>
+          <p:cNvCxnSpPr>
+            <a:cxnSpLocks/>
+          </p:cNvCxnSpPr>
+          <p:nvPr/>
+        </p:nvCxnSpPr>
+        <p:spPr>
+          <a:xfrm>
+            <a:off x="4255509" y="3454680"/>
+            <a:ext cx="3296286" cy="0"/>
+          </a:xfrm>
+          <a:prstGeom prst="straightConnector1">
+            <a:avLst/>
+          </a:prstGeom>
+          <a:ln w="57150">
+            <a:tailEnd type="triangle"/>
+          </a:ln>
+        </p:spPr>
+        <p:style>
+          <a:lnRef idx="1">
+            <a:schemeClr val="dk1"/>
+          </a:lnRef>
+          <a:fillRef idx="0">
+            <a:schemeClr val="dk1"/>
+          </a:fillRef>
+          <a:effectRef idx="0">
+            <a:schemeClr val="dk1"/>
+          </a:effectRef>
+          <a:fontRef idx="minor">
+            <a:schemeClr val="tx1"/>
+          </a:fontRef>
+        </p:style>
+      </p:cxnSp>
+      <mc:AlternateContent xmlns:mc="http://schemas.openxmlformats.org/markup-compatibility/2006">
+        <mc:Choice xmlns:a14="http://schemas.microsoft.com/office/drawing/2010/main" Requires="a14">
+          <p:sp>
+            <p:nvSpPr>
+              <p:cNvPr id="32" name="TextBox 31">
+                <a:extLst>
+                  <a:ext uri="{FF2B5EF4-FFF2-40B4-BE49-F238E27FC236}">
+                    <a16:creationId xmlns:a16="http://schemas.microsoft.com/office/drawing/2014/main" id="{7873190A-B445-41F0-8D99-1357E750266D}"/>
+                  </a:ext>
+                </a:extLst>
+              </p:cNvPr>
+              <p:cNvSpPr txBox="1"/>
+              <p:nvPr/>
+            </p:nvSpPr>
+            <p:spPr>
+              <a:xfrm>
+                <a:off x="4086935" y="0"/>
+                <a:ext cx="475132" cy="523220"/>
+              </a:xfrm>
+              <a:prstGeom prst="rect">
+                <a:avLst/>
+              </a:prstGeom>
+              <a:noFill/>
+            </p:spPr>
+            <p:txBody>
+              <a:bodyPr wrap="square" rtlCol="0">
+                <a:spAutoFit/>
+              </a:bodyPr>
+              <a:lstStyle/>
+              <a:p>
+                <a:pPr algn="ctr"/>
+                <a14:m>
+                  <m:oMathPara xmlns:m="http://schemas.openxmlformats.org/officeDocument/2006/math">
+                    <m:oMathParaPr>
+                      <m:jc m:val="centerGroup"/>
+                    </m:oMathParaPr>
+                    <m:oMath xmlns:m="http://schemas.openxmlformats.org/officeDocument/2006/math">
+                      <m:r>
+                        <a:rPr lang="en-US" sz="2800" b="1" i="1" smtClean="0">
+                          <a:latin typeface="Cambria Math" panose="02040503050406030204" pitchFamily="18" charset="0"/>
+                        </a:rPr>
+                        <m:t>𝒚</m:t>
+                      </m:r>
+                    </m:oMath>
+                  </m:oMathPara>
+                </a14:m>
+                <a:endParaRPr lang="en-IN" sz="2800" b="1"/>
+              </a:p>
+            </p:txBody>
+          </p:sp>
+        </mc:Choice>
+        <mc:Fallback>
+          <p:sp>
+            <p:nvSpPr>
+              <p:cNvPr id="32" name="TextBox 31">
+                <a:extLst>
+                  <a:ext uri="{FF2B5EF4-FFF2-40B4-BE49-F238E27FC236}">
+                    <a16:creationId xmlns:a16="http://schemas.microsoft.com/office/drawing/2014/main" id="{7873190A-B445-41F0-8D99-1357E750266D}"/>
+                  </a:ext>
+                </a:extLst>
+              </p:cNvPr>
+              <p:cNvSpPr txBox="1">
+                <a:spLocks noRot="1" noChangeAspect="1" noMove="1" noResize="1" noEditPoints="1" noAdjustHandles="1" noChangeArrowheads="1" noChangeShapeType="1" noTextEdit="1"/>
+              </p:cNvSpPr>
+              <p:nvPr/>
+            </p:nvSpPr>
+            <p:spPr>
+              <a:xfrm>
+                <a:off x="4086935" y="0"/>
+                <a:ext cx="475132" cy="523220"/>
+              </a:xfrm>
+              <a:prstGeom prst="rect">
+                <a:avLst/>
+              </a:prstGeom>
+              <a:blipFill>
+                <a:blip r:embed="rId4"/>
+                <a:stretch>
+                  <a:fillRect/>
+                </a:stretch>
+              </a:blipFill>
+            </p:spPr>
+            <p:txBody>
+              <a:bodyPr/>
+              <a:lstStyle/>
+              <a:p>
+                <a:r>
+                  <a:rPr lang="en-IN">
+                    <a:noFill/>
+                  </a:rPr>
+                  <a:t> </a:t>
+                </a:r>
+              </a:p>
+            </p:txBody>
+          </p:sp>
+        </mc:Fallback>
+      </mc:AlternateContent>
+      <mc:AlternateContent xmlns:mc="http://schemas.openxmlformats.org/markup-compatibility/2006">
+        <mc:Choice xmlns:a14="http://schemas.microsoft.com/office/drawing/2010/main" Requires="a14">
+          <p:sp>
+            <p:nvSpPr>
+              <p:cNvPr id="35" name="TextBox 34">
+                <a:extLst>
+                  <a:ext uri="{FF2B5EF4-FFF2-40B4-BE49-F238E27FC236}">
+                    <a16:creationId xmlns:a16="http://schemas.microsoft.com/office/drawing/2014/main" id="{FDFC1375-6171-4491-83C9-D656AAB232B2}"/>
+                  </a:ext>
+                </a:extLst>
+              </p:cNvPr>
+              <p:cNvSpPr txBox="1"/>
+              <p:nvPr/>
+            </p:nvSpPr>
+            <p:spPr>
+              <a:xfrm>
+                <a:off x="7466623" y="3166175"/>
+                <a:ext cx="475125" cy="523220"/>
+              </a:xfrm>
+              <a:prstGeom prst="rect">
+                <a:avLst/>
+              </a:prstGeom>
+              <a:noFill/>
+            </p:spPr>
+            <p:txBody>
+              <a:bodyPr wrap="square" rtlCol="0">
+                <a:spAutoFit/>
+              </a:bodyPr>
+              <a:lstStyle/>
+              <a:p>
+                <a:pPr algn="ctr"/>
+                <a14:m>
+                  <m:oMathPara xmlns:m="http://schemas.openxmlformats.org/officeDocument/2006/math">
+                    <m:oMathParaPr>
+                      <m:jc m:val="centerGroup"/>
+                    </m:oMathParaPr>
+                    <m:oMath xmlns:m="http://schemas.openxmlformats.org/officeDocument/2006/math">
+                      <m:r>
+                        <a:rPr lang="en-US" sz="2800" b="1" i="1" smtClean="0">
+                          <a:latin typeface="Cambria Math" panose="02040503050406030204" pitchFamily="18" charset="0"/>
+                        </a:rPr>
+                        <m:t>𝒙</m:t>
+                      </m:r>
+                    </m:oMath>
+                  </m:oMathPara>
+                </a14:m>
+                <a:endParaRPr lang="en-IN" sz="2800" b="1"/>
+              </a:p>
+            </p:txBody>
+          </p:sp>
+        </mc:Choice>
+        <mc:Fallback>
+          <p:sp>
+            <p:nvSpPr>
+              <p:cNvPr id="35" name="TextBox 34">
+                <a:extLst>
+                  <a:ext uri="{FF2B5EF4-FFF2-40B4-BE49-F238E27FC236}">
+                    <a16:creationId xmlns:a16="http://schemas.microsoft.com/office/drawing/2014/main" id="{FDFC1375-6171-4491-83C9-D656AAB232B2}"/>
+                  </a:ext>
+                </a:extLst>
+              </p:cNvPr>
+              <p:cNvSpPr txBox="1">
+                <a:spLocks noRot="1" noChangeAspect="1" noMove="1" noResize="1" noEditPoints="1" noAdjustHandles="1" noChangeArrowheads="1" noChangeShapeType="1" noTextEdit="1"/>
+              </p:cNvSpPr>
+              <p:nvPr/>
+            </p:nvSpPr>
+            <p:spPr>
+              <a:xfrm>
+                <a:off x="7466623" y="3166175"/>
+                <a:ext cx="475125" cy="523220"/>
+              </a:xfrm>
+              <a:prstGeom prst="rect">
+                <a:avLst/>
+              </a:prstGeom>
+              <a:blipFill>
+                <a:blip r:embed="rId5"/>
+                <a:stretch>
+                  <a:fillRect/>
+                </a:stretch>
+              </a:blipFill>
+            </p:spPr>
+            <p:txBody>
+              <a:bodyPr/>
+              <a:lstStyle/>
+              <a:p>
+                <a:r>
+                  <a:rPr lang="en-IN">
+                    <a:noFill/>
+                  </a:rPr>
+                  <a:t> </a:t>
+                </a:r>
+              </a:p>
+            </p:txBody>
+          </p:sp>
+        </mc:Fallback>
+      </mc:AlternateContent>
+      <p:cxnSp>
+        <p:nvCxnSpPr>
+          <p:cNvPr id="37" name="Straight Connector 36">
+            <a:extLst>
+              <a:ext uri="{FF2B5EF4-FFF2-40B4-BE49-F238E27FC236}">
+                <a16:creationId xmlns:a16="http://schemas.microsoft.com/office/drawing/2014/main" id="{CD066E56-39C0-4A30-9C54-73CD34A11AB0}"/>
+              </a:ext>
+            </a:extLst>
+          </p:cNvPr>
+          <p:cNvCxnSpPr>
+            <a:cxnSpLocks/>
+          </p:cNvCxnSpPr>
+          <p:nvPr/>
+        </p:nvCxnSpPr>
+        <p:spPr>
+          <a:xfrm>
+            <a:off x="5212287" y="1290918"/>
+            <a:ext cx="1767425" cy="1748117"/>
+          </a:xfrm>
+          <a:prstGeom prst="line">
+            <a:avLst/>
+          </a:prstGeom>
+          <a:ln w="152400"/>
+        </p:spPr>
+        <p:style>
+          <a:lnRef idx="1">
+            <a:schemeClr val="accent1"/>
+          </a:lnRef>
+          <a:fillRef idx="0">
+            <a:schemeClr val="accent1"/>
+          </a:fillRef>
+          <a:effectRef idx="0">
+            <a:schemeClr val="accent1"/>
+          </a:effectRef>
+          <a:fontRef idx="minor">
+            <a:schemeClr val="tx1"/>
+          </a:fontRef>
+        </p:style>
+      </p:cxnSp>
+      <p:sp>
+        <p:nvSpPr>
+          <p:cNvPr id="38" name="TextBox 37">
+            <a:extLst>
+              <a:ext uri="{FF2B5EF4-FFF2-40B4-BE49-F238E27FC236}">
+                <a16:creationId xmlns:a16="http://schemas.microsoft.com/office/drawing/2014/main" id="{468539B6-C7E6-4161-8BB0-75B58824E8A7}"/>
+              </a:ext>
+            </a:extLst>
+          </p:cNvPr>
+          <p:cNvSpPr txBox="1"/>
+          <p:nvPr/>
+        </p:nvSpPr>
+        <p:spPr>
+          <a:xfrm>
+            <a:off x="506585" y="3432687"/>
+            <a:ext cx="3163571" cy="523220"/>
+          </a:xfrm>
+          <a:prstGeom prst="rect">
+            <a:avLst/>
+          </a:prstGeom>
+          <a:noFill/>
+        </p:spPr>
+        <p:txBody>
+          <a:bodyPr wrap="square" rtlCol="0">
+            <a:spAutoFit/>
+          </a:bodyPr>
+          <a:lstStyle/>
+          <a:p>
+            <a:pPr algn="ctr"/>
+            <a:r>
+              <a:rPr lang="en-US" sz="2800" b="1"/>
+              <a:t>Positive correlation</a:t>
+            </a:r>
+            <a:endParaRPr lang="en-IN" sz="2800" b="1"/>
+          </a:p>
+        </p:txBody>
+      </p:sp>
+      <p:sp>
+        <p:nvSpPr>
+          <p:cNvPr id="39" name="TextBox 38">
+            <a:extLst>
+              <a:ext uri="{FF2B5EF4-FFF2-40B4-BE49-F238E27FC236}">
+                <a16:creationId xmlns:a16="http://schemas.microsoft.com/office/drawing/2014/main" id="{E791EB70-D5C4-41F0-A8A0-A3D77F258E93}"/>
+              </a:ext>
+            </a:extLst>
+          </p:cNvPr>
+          <p:cNvSpPr txBox="1"/>
+          <p:nvPr/>
+        </p:nvSpPr>
+        <p:spPr>
+          <a:xfrm>
+            <a:off x="4229566" y="3432687"/>
+            <a:ext cx="3322229" cy="523220"/>
+          </a:xfrm>
+          <a:prstGeom prst="rect">
+            <a:avLst/>
+          </a:prstGeom>
+          <a:noFill/>
+        </p:spPr>
+        <p:txBody>
+          <a:bodyPr wrap="square" rtlCol="0">
+            <a:spAutoFit/>
+          </a:bodyPr>
+          <a:lstStyle/>
+          <a:p>
+            <a:pPr algn="ctr"/>
+            <a:r>
+              <a:rPr lang="en-US" sz="2800" b="1"/>
+              <a:t>Negative correlation</a:t>
+            </a:r>
+            <a:endParaRPr lang="en-IN" sz="2800" b="1"/>
+          </a:p>
+        </p:txBody>
+      </p:sp>
+      <p:cxnSp>
+        <p:nvCxnSpPr>
+          <p:cNvPr id="40" name="Straight Arrow Connector 39">
+            <a:extLst>
+              <a:ext uri="{FF2B5EF4-FFF2-40B4-BE49-F238E27FC236}">
+                <a16:creationId xmlns:a16="http://schemas.microsoft.com/office/drawing/2014/main" id="{7BBD905E-1C37-42AA-B35C-C0B07AB7FC50}"/>
+              </a:ext>
+            </a:extLst>
+          </p:cNvPr>
+          <p:cNvCxnSpPr>
+            <a:cxnSpLocks/>
+          </p:cNvCxnSpPr>
+          <p:nvPr/>
+        </p:nvCxnSpPr>
+        <p:spPr>
+          <a:xfrm flipV="1">
+            <a:off x="8111205" y="496326"/>
+            <a:ext cx="0" cy="2958354"/>
+          </a:xfrm>
+          <a:prstGeom prst="straightConnector1">
+            <a:avLst/>
+          </a:prstGeom>
+          <a:ln w="57150">
+            <a:tailEnd type="triangle"/>
+          </a:ln>
+        </p:spPr>
+        <p:style>
+          <a:lnRef idx="1">
+            <a:schemeClr val="dk1"/>
+          </a:lnRef>
+          <a:fillRef idx="0">
+            <a:schemeClr val="dk1"/>
+          </a:fillRef>
+          <a:effectRef idx="0">
+            <a:schemeClr val="dk1"/>
+          </a:effectRef>
+          <a:fontRef idx="minor">
+            <a:schemeClr val="tx1"/>
+          </a:fontRef>
+        </p:style>
+      </p:cxnSp>
+      <p:cxnSp>
+        <p:nvCxnSpPr>
+          <p:cNvPr id="41" name="Straight Arrow Connector 40">
+            <a:extLst>
+              <a:ext uri="{FF2B5EF4-FFF2-40B4-BE49-F238E27FC236}">
+                <a16:creationId xmlns:a16="http://schemas.microsoft.com/office/drawing/2014/main" id="{0BE03DDA-A649-423E-A08D-13FC99C1AAE2}"/>
+              </a:ext>
+            </a:extLst>
+          </p:cNvPr>
+          <p:cNvCxnSpPr>
+            <a:cxnSpLocks/>
+          </p:cNvCxnSpPr>
+          <p:nvPr/>
+        </p:nvCxnSpPr>
+        <p:spPr>
+          <a:xfrm>
+            <a:off x="8111205" y="3427786"/>
+            <a:ext cx="3296286" cy="0"/>
+          </a:xfrm>
+          <a:prstGeom prst="straightConnector1">
+            <a:avLst/>
+          </a:prstGeom>
+          <a:ln w="57150">
+            <a:tailEnd type="triangle"/>
+          </a:ln>
+        </p:spPr>
+        <p:style>
+          <a:lnRef idx="1">
+            <a:schemeClr val="dk1"/>
+          </a:lnRef>
+          <a:fillRef idx="0">
+            <a:schemeClr val="dk1"/>
+          </a:fillRef>
+          <a:effectRef idx="0">
+            <a:schemeClr val="dk1"/>
+          </a:effectRef>
+          <a:fontRef idx="minor">
+            <a:schemeClr val="tx1"/>
+          </a:fontRef>
+        </p:style>
+      </p:cxnSp>
+      <mc:AlternateContent xmlns:mc="http://schemas.openxmlformats.org/markup-compatibility/2006">
+        <mc:Choice xmlns:a14="http://schemas.microsoft.com/office/drawing/2010/main" Requires="a14">
+          <p:sp>
+            <p:nvSpPr>
+              <p:cNvPr id="42" name="TextBox 41">
+                <a:extLst>
+                  <a:ext uri="{FF2B5EF4-FFF2-40B4-BE49-F238E27FC236}">
+                    <a16:creationId xmlns:a16="http://schemas.microsoft.com/office/drawing/2014/main" id="{5000B649-C641-42FB-BD7F-20D43C0E9949}"/>
+                  </a:ext>
+                </a:extLst>
+              </p:cNvPr>
+              <p:cNvSpPr txBox="1"/>
+              <p:nvPr/>
+            </p:nvSpPr>
+            <p:spPr>
+              <a:xfrm>
+                <a:off x="7942631" y="-26894"/>
+                <a:ext cx="475132" cy="523220"/>
+              </a:xfrm>
+              <a:prstGeom prst="rect">
+                <a:avLst/>
+              </a:prstGeom>
+              <a:noFill/>
+            </p:spPr>
+            <p:txBody>
+              <a:bodyPr wrap="square" rtlCol="0">
+                <a:spAutoFit/>
+              </a:bodyPr>
+              <a:lstStyle/>
+              <a:p>
+                <a:pPr algn="ctr"/>
+                <a14:m>
+                  <m:oMathPara xmlns:m="http://schemas.openxmlformats.org/officeDocument/2006/math">
+                    <m:oMathParaPr>
+                      <m:jc m:val="centerGroup"/>
+                    </m:oMathParaPr>
+                    <m:oMath xmlns:m="http://schemas.openxmlformats.org/officeDocument/2006/math">
+                      <m:r>
+                        <a:rPr lang="en-US" sz="2800" b="1" i="1" smtClean="0">
+                          <a:latin typeface="Cambria Math" panose="02040503050406030204" pitchFamily="18" charset="0"/>
+                        </a:rPr>
+                        <m:t>𝒚</m:t>
+                      </m:r>
+                    </m:oMath>
+                  </m:oMathPara>
+                </a14:m>
+                <a:endParaRPr lang="en-IN" sz="2800" b="1"/>
+              </a:p>
+            </p:txBody>
+          </p:sp>
+        </mc:Choice>
+        <mc:Fallback>
+          <p:sp>
+            <p:nvSpPr>
+              <p:cNvPr id="42" name="TextBox 41">
+                <a:extLst>
+                  <a:ext uri="{FF2B5EF4-FFF2-40B4-BE49-F238E27FC236}">
+                    <a16:creationId xmlns:a16="http://schemas.microsoft.com/office/drawing/2014/main" id="{5000B649-C641-42FB-BD7F-20D43C0E9949}"/>
+                  </a:ext>
+                </a:extLst>
+              </p:cNvPr>
+              <p:cNvSpPr txBox="1">
+                <a:spLocks noRot="1" noChangeAspect="1" noMove="1" noResize="1" noEditPoints="1" noAdjustHandles="1" noChangeArrowheads="1" noChangeShapeType="1" noTextEdit="1"/>
+              </p:cNvSpPr>
+              <p:nvPr/>
+            </p:nvSpPr>
+            <p:spPr>
+              <a:xfrm>
+                <a:off x="7942631" y="-26894"/>
+                <a:ext cx="475132" cy="523220"/>
+              </a:xfrm>
+              <a:prstGeom prst="rect">
+                <a:avLst/>
+              </a:prstGeom>
+              <a:blipFill>
+                <a:blip r:embed="rId6"/>
+                <a:stretch>
+                  <a:fillRect/>
+                </a:stretch>
+              </a:blipFill>
+            </p:spPr>
+            <p:txBody>
+              <a:bodyPr/>
+              <a:lstStyle/>
+              <a:p>
+                <a:r>
+                  <a:rPr lang="en-IN">
+                    <a:noFill/>
+                  </a:rPr>
+                  <a:t> </a:t>
+                </a:r>
+              </a:p>
+            </p:txBody>
+          </p:sp>
+        </mc:Fallback>
+      </mc:AlternateContent>
+      <mc:AlternateContent xmlns:mc="http://schemas.openxmlformats.org/markup-compatibility/2006">
+        <mc:Choice xmlns:a14="http://schemas.microsoft.com/office/drawing/2010/main" Requires="a14">
+          <p:sp>
+            <p:nvSpPr>
+              <p:cNvPr id="43" name="TextBox 42">
+                <a:extLst>
+                  <a:ext uri="{FF2B5EF4-FFF2-40B4-BE49-F238E27FC236}">
+                    <a16:creationId xmlns:a16="http://schemas.microsoft.com/office/drawing/2014/main" id="{CE376934-3F21-4A7F-9610-1D9C743FA474}"/>
+                  </a:ext>
+                </a:extLst>
+              </p:cNvPr>
+              <p:cNvSpPr txBox="1"/>
+              <p:nvPr/>
+            </p:nvSpPr>
+            <p:spPr>
+              <a:xfrm>
+                <a:off x="11322319" y="3139281"/>
+                <a:ext cx="475125" cy="523220"/>
+              </a:xfrm>
+              <a:prstGeom prst="rect">
+                <a:avLst/>
+              </a:prstGeom>
+              <a:noFill/>
+            </p:spPr>
+            <p:txBody>
+              <a:bodyPr wrap="square" rtlCol="0">
+                <a:spAutoFit/>
+              </a:bodyPr>
+              <a:lstStyle/>
+              <a:p>
+                <a:pPr algn="ctr"/>
+                <a14:m>
+                  <m:oMathPara xmlns:m="http://schemas.openxmlformats.org/officeDocument/2006/math">
+                    <m:oMathParaPr>
+                      <m:jc m:val="centerGroup"/>
+                    </m:oMathParaPr>
+                    <m:oMath xmlns:m="http://schemas.openxmlformats.org/officeDocument/2006/math">
+                      <m:r>
+                        <a:rPr lang="en-US" sz="2800" b="1" i="1" smtClean="0">
+                          <a:latin typeface="Cambria Math" panose="02040503050406030204" pitchFamily="18" charset="0"/>
+                        </a:rPr>
+                        <m:t>𝒙</m:t>
+                      </m:r>
+                    </m:oMath>
+                  </m:oMathPara>
+                </a14:m>
+                <a:endParaRPr lang="en-IN" sz="2800" b="1"/>
+              </a:p>
+            </p:txBody>
+          </p:sp>
+        </mc:Choice>
+        <mc:Fallback>
+          <p:sp>
+            <p:nvSpPr>
+              <p:cNvPr id="43" name="TextBox 42">
+                <a:extLst>
+                  <a:ext uri="{FF2B5EF4-FFF2-40B4-BE49-F238E27FC236}">
+                    <a16:creationId xmlns:a16="http://schemas.microsoft.com/office/drawing/2014/main" id="{CE376934-3F21-4A7F-9610-1D9C743FA474}"/>
+                  </a:ext>
+                </a:extLst>
+              </p:cNvPr>
+              <p:cNvSpPr txBox="1">
+                <a:spLocks noRot="1" noChangeAspect="1" noMove="1" noResize="1" noEditPoints="1" noAdjustHandles="1" noChangeArrowheads="1" noChangeShapeType="1" noTextEdit="1"/>
+              </p:cNvSpPr>
+              <p:nvPr/>
+            </p:nvSpPr>
+            <p:spPr>
+              <a:xfrm>
+                <a:off x="11322319" y="3139281"/>
+                <a:ext cx="475125" cy="523220"/>
+              </a:xfrm>
+              <a:prstGeom prst="rect">
+                <a:avLst/>
+              </a:prstGeom>
+              <a:blipFill>
+                <a:blip r:embed="rId7"/>
+                <a:stretch>
+                  <a:fillRect/>
+                </a:stretch>
+              </a:blipFill>
+            </p:spPr>
+            <p:txBody>
+              <a:bodyPr/>
+              <a:lstStyle/>
+              <a:p>
+                <a:r>
+                  <a:rPr lang="en-IN">
+                    <a:noFill/>
+                  </a:rPr>
+                  <a:t> </a:t>
+                </a:r>
+              </a:p>
+            </p:txBody>
+          </p:sp>
+        </mc:Fallback>
+      </mc:AlternateContent>
+      <p:sp>
+        <p:nvSpPr>
+          <p:cNvPr id="45" name="TextBox 44">
+            <a:extLst>
+              <a:ext uri="{FF2B5EF4-FFF2-40B4-BE49-F238E27FC236}">
+                <a16:creationId xmlns:a16="http://schemas.microsoft.com/office/drawing/2014/main" id="{84A2B8D2-CF91-4940-859B-62EA59C1EF27}"/>
+              </a:ext>
+            </a:extLst>
+          </p:cNvPr>
+          <p:cNvSpPr txBox="1"/>
+          <p:nvPr/>
+        </p:nvSpPr>
+        <p:spPr>
+          <a:xfrm>
+            <a:off x="8085262" y="3405793"/>
+            <a:ext cx="3322229" cy="523220"/>
+          </a:xfrm>
+          <a:prstGeom prst="rect">
+            <a:avLst/>
+          </a:prstGeom>
+          <a:noFill/>
+        </p:spPr>
+        <p:txBody>
+          <a:bodyPr wrap="square" rtlCol="0">
+            <a:spAutoFit/>
+          </a:bodyPr>
+          <a:lstStyle/>
+          <a:p>
+            <a:pPr algn="ctr"/>
+            <a:r>
+              <a:rPr lang="en-US" sz="2800" b="1"/>
+              <a:t>No correlation</a:t>
+            </a:r>
+            <a:endParaRPr lang="en-IN" sz="2800" b="1"/>
+          </a:p>
+        </p:txBody>
+      </p:sp>
+      <p:sp>
+        <p:nvSpPr>
+          <p:cNvPr id="20" name="Rectangle 19">
+            <a:extLst>
+              <a:ext uri="{FF2B5EF4-FFF2-40B4-BE49-F238E27FC236}">
+                <a16:creationId xmlns:a16="http://schemas.microsoft.com/office/drawing/2014/main" id="{D0BDCBA1-0E9E-45CF-8C43-15805AE84005}"/>
+              </a:ext>
+            </a:extLst>
+          </p:cNvPr>
+          <p:cNvSpPr/>
+          <p:nvPr/>
+        </p:nvSpPr>
+        <p:spPr>
+          <a:xfrm>
+            <a:off x="8597153" y="1066800"/>
+            <a:ext cx="2303920" cy="1900518"/>
+          </a:xfrm>
+          <a:prstGeom prst="rect">
+            <a:avLst/>
+          </a:prstGeom>
+        </p:spPr>
+        <p:style>
+          <a:lnRef idx="2">
+            <a:schemeClr val="accent1">
+              <a:shade val="50000"/>
+            </a:schemeClr>
+          </a:lnRef>
+          <a:fillRef idx="1">
+            <a:schemeClr val="accent1"/>
+          </a:fillRef>
+          <a:effectRef idx="0">
+            <a:schemeClr val="accent1"/>
+          </a:effectRef>
+          <a:fontRef idx="minor">
+            <a:schemeClr val="lt1"/>
+          </a:fontRef>
+        </p:style>
+        <p:txBody>
+          <a:bodyPr rtlCol="0" anchor="ctr"/>
+          <a:lstStyle/>
+          <a:p>
+            <a:pPr algn="ctr"/>
+            <a:endParaRPr lang="en-IN"/>
+          </a:p>
+        </p:txBody>
+      </p:sp>
+      <p:cxnSp>
+        <p:nvCxnSpPr>
+          <p:cNvPr id="46" name="Straight Arrow Connector 45">
+            <a:extLst>
+              <a:ext uri="{FF2B5EF4-FFF2-40B4-BE49-F238E27FC236}">
+                <a16:creationId xmlns:a16="http://schemas.microsoft.com/office/drawing/2014/main" id="{3EC10A56-947B-47FC-838D-19EA4B7F6C65}"/>
+              </a:ext>
+            </a:extLst>
+          </p:cNvPr>
+          <p:cNvCxnSpPr>
+            <a:cxnSpLocks/>
+          </p:cNvCxnSpPr>
+          <p:nvPr/>
+        </p:nvCxnSpPr>
+        <p:spPr>
+          <a:xfrm flipV="1">
+            <a:off x="3125956" y="4294094"/>
+            <a:ext cx="0" cy="1982835"/>
+          </a:xfrm>
+          <a:prstGeom prst="straightConnector1">
+            <a:avLst/>
+          </a:prstGeom>
+          <a:ln w="57150">
+            <a:tailEnd type="triangle"/>
+          </a:ln>
+        </p:spPr>
+        <p:style>
+          <a:lnRef idx="1">
+            <a:schemeClr val="dk1"/>
+          </a:lnRef>
+          <a:fillRef idx="0">
+            <a:schemeClr val="dk1"/>
+          </a:fillRef>
+          <a:effectRef idx="0">
+            <a:schemeClr val="dk1"/>
+          </a:effectRef>
+          <a:fontRef idx="minor">
+            <a:schemeClr val="tx1"/>
+          </a:fontRef>
+        </p:style>
+      </p:cxnSp>
+      <p:cxnSp>
+        <p:nvCxnSpPr>
+          <p:cNvPr id="47" name="Straight Arrow Connector 46">
+            <a:extLst>
+              <a:ext uri="{FF2B5EF4-FFF2-40B4-BE49-F238E27FC236}">
+                <a16:creationId xmlns:a16="http://schemas.microsoft.com/office/drawing/2014/main" id="{13885F55-BD7F-4DF8-ABAD-4FA71446DEC7}"/>
+              </a:ext>
+            </a:extLst>
+          </p:cNvPr>
+          <p:cNvCxnSpPr>
+            <a:cxnSpLocks/>
+          </p:cNvCxnSpPr>
+          <p:nvPr/>
+        </p:nvCxnSpPr>
+        <p:spPr>
+          <a:xfrm>
+            <a:off x="3125956" y="6250035"/>
+            <a:ext cx="3296286" cy="0"/>
+          </a:xfrm>
+          <a:prstGeom prst="straightConnector1">
+            <a:avLst/>
+          </a:prstGeom>
+          <a:ln w="57150">
+            <a:tailEnd type="triangle"/>
+          </a:ln>
+        </p:spPr>
+        <p:style>
+          <a:lnRef idx="1">
+            <a:schemeClr val="dk1"/>
+          </a:lnRef>
+          <a:fillRef idx="0">
+            <a:schemeClr val="dk1"/>
+          </a:fillRef>
+          <a:effectRef idx="0">
+            <a:schemeClr val="dk1"/>
+          </a:effectRef>
+          <a:fontRef idx="minor">
+            <a:schemeClr val="tx1"/>
+          </a:fontRef>
+        </p:style>
+      </p:cxnSp>
+      <mc:AlternateContent xmlns:mc="http://schemas.openxmlformats.org/markup-compatibility/2006">
+        <mc:Choice xmlns:a14="http://schemas.microsoft.com/office/drawing/2010/main" Requires="a14">
+          <p:sp>
+            <p:nvSpPr>
+              <p:cNvPr id="48" name="TextBox 47">
+                <a:extLst>
+                  <a:ext uri="{FF2B5EF4-FFF2-40B4-BE49-F238E27FC236}">
+                    <a16:creationId xmlns:a16="http://schemas.microsoft.com/office/drawing/2014/main" id="{B06FA0CB-0774-4A44-A942-F38B31124205}"/>
+                  </a:ext>
+                </a:extLst>
+              </p:cNvPr>
+              <p:cNvSpPr txBox="1"/>
+              <p:nvPr/>
+            </p:nvSpPr>
+            <p:spPr>
+              <a:xfrm>
+                <a:off x="2923281" y="3775776"/>
+                <a:ext cx="475132" cy="523220"/>
+              </a:xfrm>
+              <a:prstGeom prst="rect">
+                <a:avLst/>
+              </a:prstGeom>
+              <a:noFill/>
+            </p:spPr>
+            <p:txBody>
+              <a:bodyPr wrap="square" rtlCol="0">
+                <a:spAutoFit/>
+              </a:bodyPr>
+              <a:lstStyle/>
+              <a:p>
+                <a:pPr algn="ctr"/>
+                <a14:m>
+                  <m:oMathPara xmlns:m="http://schemas.openxmlformats.org/officeDocument/2006/math">
+                    <m:oMathParaPr>
+                      <m:jc m:val="centerGroup"/>
+                    </m:oMathParaPr>
+                    <m:oMath xmlns:m="http://schemas.openxmlformats.org/officeDocument/2006/math">
+                      <m:r>
+                        <a:rPr lang="en-US" sz="2800" b="1" i="1" smtClean="0">
+                          <a:latin typeface="Cambria Math" panose="02040503050406030204" pitchFamily="18" charset="0"/>
+                        </a:rPr>
+                        <m:t>𝒚</m:t>
+                      </m:r>
+                    </m:oMath>
+                  </m:oMathPara>
+                </a14:m>
+                <a:endParaRPr lang="en-IN" sz="2800" b="1"/>
+              </a:p>
+            </p:txBody>
+          </p:sp>
+        </mc:Choice>
+        <mc:Fallback>
+          <p:sp>
+            <p:nvSpPr>
+              <p:cNvPr id="48" name="TextBox 47">
+                <a:extLst>
+                  <a:ext uri="{FF2B5EF4-FFF2-40B4-BE49-F238E27FC236}">
+                    <a16:creationId xmlns:a16="http://schemas.microsoft.com/office/drawing/2014/main" id="{B06FA0CB-0774-4A44-A942-F38B31124205}"/>
+                  </a:ext>
+                </a:extLst>
+              </p:cNvPr>
+              <p:cNvSpPr txBox="1">
+                <a:spLocks noRot="1" noChangeAspect="1" noMove="1" noResize="1" noEditPoints="1" noAdjustHandles="1" noChangeArrowheads="1" noChangeShapeType="1" noTextEdit="1"/>
+              </p:cNvSpPr>
+              <p:nvPr/>
+            </p:nvSpPr>
+            <p:spPr>
+              <a:xfrm>
+                <a:off x="2923281" y="3775776"/>
+                <a:ext cx="475132" cy="523220"/>
+              </a:xfrm>
+              <a:prstGeom prst="rect">
+                <a:avLst/>
+              </a:prstGeom>
+              <a:blipFill>
+                <a:blip r:embed="rId8"/>
+                <a:stretch>
+                  <a:fillRect/>
+                </a:stretch>
+              </a:blipFill>
+            </p:spPr>
+            <p:txBody>
+              <a:bodyPr/>
+              <a:lstStyle/>
+              <a:p>
+                <a:r>
+                  <a:rPr lang="en-IN">
+                    <a:noFill/>
+                  </a:rPr>
+                  <a:t> </a:t>
+                </a:r>
+              </a:p>
+            </p:txBody>
+          </p:sp>
+        </mc:Fallback>
+      </mc:AlternateContent>
+      <mc:AlternateContent xmlns:mc="http://schemas.openxmlformats.org/markup-compatibility/2006">
+        <mc:Choice xmlns:a14="http://schemas.microsoft.com/office/drawing/2010/main" Requires="a14">
+          <p:sp>
+            <p:nvSpPr>
+              <p:cNvPr id="49" name="TextBox 48">
+                <a:extLst>
+                  <a:ext uri="{FF2B5EF4-FFF2-40B4-BE49-F238E27FC236}">
+                    <a16:creationId xmlns:a16="http://schemas.microsoft.com/office/drawing/2014/main" id="{5F40CA95-8540-4889-9C3B-3A15DC18B358}"/>
+                  </a:ext>
+                </a:extLst>
+              </p:cNvPr>
+              <p:cNvSpPr txBox="1"/>
+              <p:nvPr/>
+            </p:nvSpPr>
+            <p:spPr>
+              <a:xfrm>
+                <a:off x="6337070" y="5961530"/>
+                <a:ext cx="475125" cy="523220"/>
+              </a:xfrm>
+              <a:prstGeom prst="rect">
+                <a:avLst/>
+              </a:prstGeom>
+              <a:noFill/>
+            </p:spPr>
+            <p:txBody>
+              <a:bodyPr wrap="square" rtlCol="0">
+                <a:spAutoFit/>
+              </a:bodyPr>
+              <a:lstStyle/>
+              <a:p>
+                <a:pPr algn="ctr"/>
+                <a14:m>
+                  <m:oMathPara xmlns:m="http://schemas.openxmlformats.org/officeDocument/2006/math">
+                    <m:oMathParaPr>
+                      <m:jc m:val="centerGroup"/>
+                    </m:oMathParaPr>
+                    <m:oMath xmlns:m="http://schemas.openxmlformats.org/officeDocument/2006/math">
+                      <m:r>
+                        <a:rPr lang="en-US" sz="2800" b="1" i="1" smtClean="0">
+                          <a:latin typeface="Cambria Math" panose="02040503050406030204" pitchFamily="18" charset="0"/>
+                        </a:rPr>
+                        <m:t>𝒙</m:t>
+                      </m:r>
+                    </m:oMath>
+                  </m:oMathPara>
+                </a14:m>
+                <a:endParaRPr lang="en-IN" sz="2800" b="1"/>
+              </a:p>
+            </p:txBody>
+          </p:sp>
+        </mc:Choice>
+        <mc:Fallback>
+          <p:sp>
+            <p:nvSpPr>
+              <p:cNvPr id="49" name="TextBox 48">
+                <a:extLst>
+                  <a:ext uri="{FF2B5EF4-FFF2-40B4-BE49-F238E27FC236}">
+                    <a16:creationId xmlns:a16="http://schemas.microsoft.com/office/drawing/2014/main" id="{5F40CA95-8540-4889-9C3B-3A15DC18B358}"/>
+                  </a:ext>
+                </a:extLst>
+              </p:cNvPr>
+              <p:cNvSpPr txBox="1">
+                <a:spLocks noRot="1" noChangeAspect="1" noMove="1" noResize="1" noEditPoints="1" noAdjustHandles="1" noChangeArrowheads="1" noChangeShapeType="1" noTextEdit="1"/>
+              </p:cNvSpPr>
+              <p:nvPr/>
+            </p:nvSpPr>
+            <p:spPr>
+              <a:xfrm>
+                <a:off x="6337070" y="5961530"/>
+                <a:ext cx="475125" cy="523220"/>
+              </a:xfrm>
+              <a:prstGeom prst="rect">
+                <a:avLst/>
+              </a:prstGeom>
+              <a:blipFill>
+                <a:blip r:embed="rId9"/>
+                <a:stretch>
+                  <a:fillRect/>
+                </a:stretch>
+              </a:blipFill>
+            </p:spPr>
+            <p:txBody>
+              <a:bodyPr/>
+              <a:lstStyle/>
+              <a:p>
+                <a:r>
+                  <a:rPr lang="en-IN">
+                    <a:noFill/>
+                  </a:rPr>
+                  <a:t> </a:t>
+                </a:r>
+              </a:p>
+            </p:txBody>
+          </p:sp>
+        </mc:Fallback>
+      </mc:AlternateContent>
+      <p:cxnSp>
+        <p:nvCxnSpPr>
+          <p:cNvPr id="50" name="Straight Connector 49">
+            <a:extLst>
+              <a:ext uri="{FF2B5EF4-FFF2-40B4-BE49-F238E27FC236}">
+                <a16:creationId xmlns:a16="http://schemas.microsoft.com/office/drawing/2014/main" id="{51B04730-C056-4482-AA2E-1F2FB125C300}"/>
+              </a:ext>
+            </a:extLst>
+          </p:cNvPr>
+          <p:cNvCxnSpPr>
+            <a:cxnSpLocks/>
+          </p:cNvCxnSpPr>
+          <p:nvPr/>
+        </p:nvCxnSpPr>
+        <p:spPr>
+          <a:xfrm flipV="1">
+            <a:off x="3670156" y="4742748"/>
+            <a:ext cx="1129146" cy="1083097"/>
+          </a:xfrm>
+          <a:prstGeom prst="line">
+            <a:avLst/>
+          </a:prstGeom>
+          <a:ln w="28575"/>
+        </p:spPr>
+        <p:style>
+          <a:lnRef idx="1">
+            <a:schemeClr val="accent1"/>
+          </a:lnRef>
+          <a:fillRef idx="0">
+            <a:schemeClr val="accent1"/>
+          </a:fillRef>
+          <a:effectRef idx="0">
+            <a:schemeClr val="accent1"/>
+          </a:effectRef>
+          <a:fontRef idx="minor">
+            <a:schemeClr val="tx1"/>
+          </a:fontRef>
+        </p:style>
+      </p:cxnSp>
+      <p:cxnSp>
+        <p:nvCxnSpPr>
+          <p:cNvPr id="51" name="Straight Arrow Connector 50">
+            <a:extLst>
+              <a:ext uri="{FF2B5EF4-FFF2-40B4-BE49-F238E27FC236}">
+                <a16:creationId xmlns:a16="http://schemas.microsoft.com/office/drawing/2014/main" id="{7FFAC61E-C521-4F84-99E8-867DFE9C1208}"/>
+              </a:ext>
+            </a:extLst>
+          </p:cNvPr>
+          <p:cNvCxnSpPr>
+            <a:cxnSpLocks/>
+          </p:cNvCxnSpPr>
+          <p:nvPr/>
+        </p:nvCxnSpPr>
+        <p:spPr>
+          <a:xfrm flipV="1">
+            <a:off x="6885680" y="4294094"/>
+            <a:ext cx="13633" cy="1982836"/>
+          </a:xfrm>
+          <a:prstGeom prst="straightConnector1">
+            <a:avLst/>
+          </a:prstGeom>
+          <a:ln w="57150">
+            <a:tailEnd type="triangle"/>
+          </a:ln>
+        </p:spPr>
+        <p:style>
+          <a:lnRef idx="1">
+            <a:schemeClr val="dk1"/>
+          </a:lnRef>
+          <a:fillRef idx="0">
+            <a:schemeClr val="dk1"/>
+          </a:fillRef>
+          <a:effectRef idx="0">
+            <a:schemeClr val="dk1"/>
+          </a:effectRef>
+          <a:fontRef idx="minor">
+            <a:schemeClr val="tx1"/>
+          </a:fontRef>
+        </p:style>
+      </p:cxnSp>
+      <p:cxnSp>
+        <p:nvCxnSpPr>
+          <p:cNvPr id="52" name="Straight Arrow Connector 51">
+            <a:extLst>
+              <a:ext uri="{FF2B5EF4-FFF2-40B4-BE49-F238E27FC236}">
+                <a16:creationId xmlns:a16="http://schemas.microsoft.com/office/drawing/2014/main" id="{89F2A4A1-8ECE-4C72-841C-594487257B67}"/>
+              </a:ext>
+            </a:extLst>
+          </p:cNvPr>
+          <p:cNvCxnSpPr>
+            <a:cxnSpLocks/>
+          </p:cNvCxnSpPr>
+          <p:nvPr/>
+        </p:nvCxnSpPr>
+        <p:spPr>
+          <a:xfrm>
+            <a:off x="6885680" y="6250035"/>
+            <a:ext cx="3296286" cy="0"/>
+          </a:xfrm>
+          <a:prstGeom prst="straightConnector1">
+            <a:avLst/>
+          </a:prstGeom>
+          <a:ln w="57150">
+            <a:tailEnd type="triangle"/>
+          </a:ln>
+        </p:spPr>
+        <p:style>
+          <a:lnRef idx="1">
+            <a:schemeClr val="dk1"/>
+          </a:lnRef>
+          <a:fillRef idx="0">
+            <a:schemeClr val="dk1"/>
+          </a:fillRef>
+          <a:effectRef idx="0">
+            <a:schemeClr val="dk1"/>
+          </a:effectRef>
+          <a:fontRef idx="minor">
+            <a:schemeClr val="tx1"/>
+          </a:fontRef>
+        </p:style>
+      </p:cxnSp>
+      <mc:AlternateContent xmlns:mc="http://schemas.openxmlformats.org/markup-compatibility/2006">
+        <mc:Choice xmlns:a14="http://schemas.microsoft.com/office/drawing/2010/main" Requires="a14">
+          <p:sp>
+            <p:nvSpPr>
+              <p:cNvPr id="53" name="TextBox 52">
+                <a:extLst>
+                  <a:ext uri="{FF2B5EF4-FFF2-40B4-BE49-F238E27FC236}">
+                    <a16:creationId xmlns:a16="http://schemas.microsoft.com/office/drawing/2014/main" id="{05A2D671-FB4D-426F-88B2-86A20BBE247E}"/>
+                  </a:ext>
+                </a:extLst>
+              </p:cNvPr>
+              <p:cNvSpPr txBox="1"/>
+              <p:nvPr/>
+            </p:nvSpPr>
+            <p:spPr>
+              <a:xfrm>
+                <a:off x="6664567" y="3774143"/>
+                <a:ext cx="475132" cy="523220"/>
+              </a:xfrm>
+              <a:prstGeom prst="rect">
+                <a:avLst/>
+              </a:prstGeom>
+              <a:noFill/>
+            </p:spPr>
+            <p:txBody>
+              <a:bodyPr wrap="square" rtlCol="0">
+                <a:spAutoFit/>
+              </a:bodyPr>
+              <a:lstStyle/>
+              <a:p>
+                <a:pPr algn="ctr"/>
+                <a14:m>
+                  <m:oMathPara xmlns:m="http://schemas.openxmlformats.org/officeDocument/2006/math">
+                    <m:oMathParaPr>
+                      <m:jc m:val="centerGroup"/>
+                    </m:oMathParaPr>
+                    <m:oMath xmlns:m="http://schemas.openxmlformats.org/officeDocument/2006/math">
+                      <m:r>
+                        <a:rPr lang="en-US" sz="2800" b="1" i="1" smtClean="0">
+                          <a:latin typeface="Cambria Math" panose="02040503050406030204" pitchFamily="18" charset="0"/>
+                        </a:rPr>
+                        <m:t>𝒚</m:t>
+                      </m:r>
+                    </m:oMath>
+                  </m:oMathPara>
+                </a14:m>
+                <a:endParaRPr lang="en-IN" sz="2800" b="1"/>
+              </a:p>
+            </p:txBody>
+          </p:sp>
+        </mc:Choice>
+        <mc:Fallback>
+          <p:sp>
+            <p:nvSpPr>
+              <p:cNvPr id="53" name="TextBox 52">
+                <a:extLst>
+                  <a:ext uri="{FF2B5EF4-FFF2-40B4-BE49-F238E27FC236}">
+                    <a16:creationId xmlns:a16="http://schemas.microsoft.com/office/drawing/2014/main" id="{05A2D671-FB4D-426F-88B2-86A20BBE247E}"/>
+                  </a:ext>
+                </a:extLst>
+              </p:cNvPr>
+              <p:cNvSpPr txBox="1">
+                <a:spLocks noRot="1" noChangeAspect="1" noMove="1" noResize="1" noEditPoints="1" noAdjustHandles="1" noChangeArrowheads="1" noChangeShapeType="1" noTextEdit="1"/>
+              </p:cNvSpPr>
+              <p:nvPr/>
+            </p:nvSpPr>
+            <p:spPr>
+              <a:xfrm>
+                <a:off x="6664567" y="3774143"/>
+                <a:ext cx="475132" cy="523220"/>
+              </a:xfrm>
+              <a:prstGeom prst="rect">
+                <a:avLst/>
+              </a:prstGeom>
+              <a:blipFill>
+                <a:blip r:embed="rId10"/>
+                <a:stretch>
+                  <a:fillRect/>
+                </a:stretch>
+              </a:blipFill>
+            </p:spPr>
+            <p:txBody>
+              <a:bodyPr/>
+              <a:lstStyle/>
+              <a:p>
+                <a:r>
+                  <a:rPr lang="en-IN">
+                    <a:noFill/>
+                  </a:rPr>
+                  <a:t> </a:t>
+                </a:r>
+              </a:p>
+            </p:txBody>
+          </p:sp>
+        </mc:Fallback>
+      </mc:AlternateContent>
+      <p:cxnSp>
+        <p:nvCxnSpPr>
+          <p:cNvPr id="54" name="Straight Connector 53">
+            <a:extLst>
+              <a:ext uri="{FF2B5EF4-FFF2-40B4-BE49-F238E27FC236}">
+                <a16:creationId xmlns:a16="http://schemas.microsoft.com/office/drawing/2014/main" id="{6AF878BF-AE40-41A6-BA39-490CA9F4552E}"/>
+              </a:ext>
+            </a:extLst>
+          </p:cNvPr>
+          <p:cNvCxnSpPr>
+            <a:cxnSpLocks/>
+          </p:cNvCxnSpPr>
+          <p:nvPr/>
+        </p:nvCxnSpPr>
+        <p:spPr>
+          <a:xfrm>
+            <a:off x="7793571" y="4755400"/>
+            <a:ext cx="1192120" cy="1091642"/>
+          </a:xfrm>
+          <a:prstGeom prst="line">
+            <a:avLst/>
+          </a:prstGeom>
+          <a:ln w="28575"/>
+        </p:spPr>
+        <p:style>
+          <a:lnRef idx="1">
+            <a:schemeClr val="accent1"/>
+          </a:lnRef>
+          <a:fillRef idx="0">
+            <a:schemeClr val="accent1"/>
+          </a:fillRef>
+          <a:effectRef idx="0">
+            <a:schemeClr val="accent1"/>
+          </a:effectRef>
+          <a:fontRef idx="minor">
+            <a:schemeClr val="tx1"/>
+          </a:fontRef>
+        </p:style>
+      </p:cxnSp>
+      <p:sp>
+        <p:nvSpPr>
+          <p:cNvPr id="55" name="TextBox 54">
+            <a:extLst>
+              <a:ext uri="{FF2B5EF4-FFF2-40B4-BE49-F238E27FC236}">
+                <a16:creationId xmlns:a16="http://schemas.microsoft.com/office/drawing/2014/main" id="{73EBCF8C-EF52-4978-ABA9-AFDA9DF57204}"/>
+              </a:ext>
+            </a:extLst>
+          </p:cNvPr>
+          <p:cNvSpPr txBox="1"/>
+          <p:nvPr/>
+        </p:nvSpPr>
+        <p:spPr>
+          <a:xfrm>
+            <a:off x="1963693" y="2747078"/>
+            <a:ext cx="1599692" cy="523220"/>
+          </a:xfrm>
+          <a:prstGeom prst="rect">
+            <a:avLst/>
+          </a:prstGeom>
+          <a:noFill/>
+        </p:spPr>
+        <p:txBody>
+          <a:bodyPr wrap="square" rtlCol="0">
+            <a:spAutoFit/>
+          </a:bodyPr>
+          <a:lstStyle/>
+          <a:p>
+            <a:pPr algn="ctr"/>
+            <a:r>
+              <a:rPr lang="en-US" sz="2800" b="1"/>
+              <a:t>(0 &lt; r &lt; 1)</a:t>
+            </a:r>
+            <a:endParaRPr lang="en-IN" sz="2800" b="1"/>
+          </a:p>
+        </p:txBody>
+      </p:sp>
+      <p:sp>
+        <p:nvSpPr>
+          <p:cNvPr id="56" name="TextBox 55">
+            <a:extLst>
+              <a:ext uri="{FF2B5EF4-FFF2-40B4-BE49-F238E27FC236}">
+                <a16:creationId xmlns:a16="http://schemas.microsoft.com/office/drawing/2014/main" id="{95349A3E-18AD-440D-B502-EBD950440AB7}"/>
+              </a:ext>
+            </a:extLst>
+          </p:cNvPr>
+          <p:cNvSpPr txBox="1"/>
+          <p:nvPr/>
+        </p:nvSpPr>
+        <p:spPr>
+          <a:xfrm>
+            <a:off x="7033308" y="5536713"/>
+            <a:ext cx="1192120" cy="523220"/>
+          </a:xfrm>
+          <a:prstGeom prst="rect">
+            <a:avLst/>
+          </a:prstGeom>
+          <a:noFill/>
+        </p:spPr>
+        <p:txBody>
+          <a:bodyPr wrap="square" rtlCol="0">
+            <a:spAutoFit/>
+          </a:bodyPr>
+          <a:lstStyle/>
+          <a:p>
+            <a:pPr algn="ctr"/>
+            <a:r>
+              <a:rPr lang="en-US" sz="2800" b="1"/>
+              <a:t>(r = -1)</a:t>
+            </a:r>
+            <a:endParaRPr lang="en-IN" sz="2800" b="1"/>
+          </a:p>
+        </p:txBody>
+      </p:sp>
+      <p:sp>
+        <p:nvSpPr>
+          <p:cNvPr id="60" name="TextBox 59">
+            <a:extLst>
+              <a:ext uri="{FF2B5EF4-FFF2-40B4-BE49-F238E27FC236}">
+                <a16:creationId xmlns:a16="http://schemas.microsoft.com/office/drawing/2014/main" id="{20DF4475-A365-4C45-9889-216F34D33289}"/>
+              </a:ext>
+            </a:extLst>
+          </p:cNvPr>
+          <p:cNvSpPr txBox="1"/>
+          <p:nvPr/>
+        </p:nvSpPr>
+        <p:spPr>
+          <a:xfrm>
+            <a:off x="1684624" y="6289161"/>
+            <a:ext cx="5164313" cy="523220"/>
+          </a:xfrm>
+          <a:prstGeom prst="rect">
+            <a:avLst/>
+          </a:prstGeom>
+          <a:noFill/>
+        </p:spPr>
+        <p:txBody>
+          <a:bodyPr wrap="square" rtlCol="0">
+            <a:spAutoFit/>
+          </a:bodyPr>
+          <a:lstStyle/>
+          <a:p>
+            <a:pPr algn="ctr"/>
+            <a:r>
+              <a:rPr lang="en-US" sz="2800" b="1"/>
+              <a:t>Perfect Positive Correlation</a:t>
+            </a:r>
+            <a:endParaRPr lang="en-IN" sz="2800" b="1"/>
+          </a:p>
+        </p:txBody>
+      </p:sp>
+      <p:sp>
+        <p:nvSpPr>
+          <p:cNvPr id="61" name="TextBox 60">
+            <a:extLst>
+              <a:ext uri="{FF2B5EF4-FFF2-40B4-BE49-F238E27FC236}">
+                <a16:creationId xmlns:a16="http://schemas.microsoft.com/office/drawing/2014/main" id="{D06BAA85-1CD3-4B6E-A405-186207C07A13}"/>
+              </a:ext>
+            </a:extLst>
+          </p:cNvPr>
+          <p:cNvSpPr txBox="1"/>
+          <p:nvPr/>
+        </p:nvSpPr>
+        <p:spPr>
+          <a:xfrm>
+            <a:off x="6457130" y="6289161"/>
+            <a:ext cx="5164313" cy="523220"/>
+          </a:xfrm>
+          <a:prstGeom prst="rect">
+            <a:avLst/>
+          </a:prstGeom>
+          <a:noFill/>
+        </p:spPr>
+        <p:txBody>
+          <a:bodyPr wrap="square" rtlCol="0">
+            <a:spAutoFit/>
+          </a:bodyPr>
+          <a:lstStyle/>
+          <a:p>
+            <a:pPr algn="ctr"/>
+            <a:r>
+              <a:rPr lang="en-US" sz="2800" b="1"/>
+              <a:t>Perfect Negative Correlation</a:t>
+            </a:r>
+            <a:endParaRPr lang="en-IN" sz="2800" b="1"/>
+          </a:p>
+        </p:txBody>
+      </p:sp>
+      <p:sp>
+        <p:nvSpPr>
+          <p:cNvPr id="62" name="TextBox 61">
+            <a:extLst>
+              <a:ext uri="{FF2B5EF4-FFF2-40B4-BE49-F238E27FC236}">
+                <a16:creationId xmlns:a16="http://schemas.microsoft.com/office/drawing/2014/main" id="{8F5A69E9-B087-473B-AD65-E6C07737CC39}"/>
+              </a:ext>
+            </a:extLst>
+          </p:cNvPr>
+          <p:cNvSpPr txBox="1"/>
+          <p:nvPr/>
+        </p:nvSpPr>
+        <p:spPr>
+          <a:xfrm>
+            <a:off x="4881201" y="5536713"/>
+            <a:ext cx="1392012" cy="523220"/>
+          </a:xfrm>
+          <a:prstGeom prst="rect">
+            <a:avLst/>
+          </a:prstGeom>
+          <a:noFill/>
+        </p:spPr>
+        <p:txBody>
+          <a:bodyPr wrap="square" rtlCol="0">
+            <a:spAutoFit/>
+          </a:bodyPr>
+          <a:lstStyle/>
+          <a:p>
+            <a:pPr algn="ctr"/>
+            <a:r>
+              <a:rPr lang="en-US" sz="2800" b="1"/>
+              <a:t>(r = +1)</a:t>
+            </a:r>
+            <a:endParaRPr lang="en-IN" sz="2800" b="1"/>
+          </a:p>
+        </p:txBody>
+      </p:sp>
+      <p:sp>
+        <p:nvSpPr>
+          <p:cNvPr id="63" name="TextBox 62">
+            <a:extLst>
+              <a:ext uri="{FF2B5EF4-FFF2-40B4-BE49-F238E27FC236}">
+                <a16:creationId xmlns:a16="http://schemas.microsoft.com/office/drawing/2014/main" id="{7EA475B6-A5B1-4706-B017-142D8E8BE965}"/>
+              </a:ext>
+            </a:extLst>
+          </p:cNvPr>
+          <p:cNvSpPr txBox="1"/>
+          <p:nvPr/>
+        </p:nvSpPr>
+        <p:spPr>
+          <a:xfrm>
+            <a:off x="4484134" y="2719365"/>
+            <a:ext cx="1693104" cy="523220"/>
+          </a:xfrm>
+          <a:prstGeom prst="rect">
+            <a:avLst/>
+          </a:prstGeom>
+          <a:noFill/>
+        </p:spPr>
+        <p:txBody>
+          <a:bodyPr wrap="square" rtlCol="0">
+            <a:spAutoFit/>
+          </a:bodyPr>
+          <a:lstStyle/>
+          <a:p>
+            <a:pPr algn="ctr"/>
+            <a:r>
+              <a:rPr lang="en-US" sz="2800" b="1"/>
+              <a:t>(-1 &lt; r &lt; 0)</a:t>
+            </a:r>
+            <a:endParaRPr lang="en-IN" sz="2800" b="1"/>
+          </a:p>
+        </p:txBody>
+      </p:sp>
+      <p:sp>
+        <p:nvSpPr>
+          <p:cNvPr id="64" name="TextBox 63">
+            <a:extLst>
+              <a:ext uri="{FF2B5EF4-FFF2-40B4-BE49-F238E27FC236}">
+                <a16:creationId xmlns:a16="http://schemas.microsoft.com/office/drawing/2014/main" id="{79DE4D0C-B609-4F0A-9D0B-A9AE272A1A2F}"/>
+              </a:ext>
+            </a:extLst>
+          </p:cNvPr>
+          <p:cNvSpPr txBox="1"/>
+          <p:nvPr/>
+        </p:nvSpPr>
+        <p:spPr>
+          <a:xfrm>
+            <a:off x="9129571" y="1830853"/>
+            <a:ext cx="1192120" cy="523220"/>
+          </a:xfrm>
+          <a:prstGeom prst="rect">
+            <a:avLst/>
+          </a:prstGeom>
+          <a:noFill/>
+        </p:spPr>
+        <p:txBody>
+          <a:bodyPr wrap="square" rtlCol="0">
+            <a:spAutoFit/>
+          </a:bodyPr>
+          <a:lstStyle/>
+          <a:p>
+            <a:pPr algn="ctr"/>
+            <a:r>
+              <a:rPr lang="en-US" sz="2800" b="1"/>
+              <a:t>(r = 0)</a:t>
+            </a:r>
+            <a:endParaRPr lang="en-IN" sz="2800" b="1"/>
+          </a:p>
+        </p:txBody>
+      </p:sp>
+    </p:spTree>
+    <p:extLst>
+      <p:ext uri="{BB962C8B-B14F-4D97-AF65-F5344CB8AC3E}">
+        <p14:creationId xmlns:p14="http://schemas.microsoft.com/office/powerpoint/2010/main" val="400377123"/>
       </p:ext>
     </p:extLst>
   </p:cSld>

</xml_diff>